<commit_message>
Deck: add closing mapping slide (endpoint→REFDB tables/columns/sources)
</commit_message>
<xml_diff>
--- a/docs/refb-endpoints-data-sources.pptx
+++ b/docs/refb-endpoints-data-sources.pptx
@@ -13,6 +13,7 @@
     <p:sldId id="261" r:id="rId12"/>
     <p:sldId id="262" r:id="rId13"/>
     <p:sldId id="263" r:id="rId14"/>
+    <p:sldId id="264" r:id="rId15"/>
   </p:sldIdLst>
   <p:sldSz cx="9144000" cy="6858000" type="screen4x3"/>
   <p:notesSz cx="6858000" cy="9144000"/>
@@ -3930,6 +3931,507 @@
           </a:p>
         </p:txBody>
       </p:sp>
+    </p:spTree>
+  </p:cSld>
+  <p:clrMapOvr>
+    <a:masterClrMapping/>
+  </p:clrMapOvr>
+</p:sld>
+</file>
+
+<file path=ppt/slides/slide9.xml><?xml version="1.0" encoding="utf-8"?>
+<p:sld xmlns:a="http://schemas.openxmlformats.org/drawingml/2006/main" xmlns:p="http://schemas.openxmlformats.org/presentationml/2006/main" xmlns:r="http://schemas.openxmlformats.org/officeDocument/2006/relationships">
+  <p:cSld>
+    <p:spTree>
+      <p:nvGrpSpPr>
+        <p:cNvPr id="1" name=""/>
+        <p:cNvGrpSpPr/>
+        <p:nvPr/>
+      </p:nvGrpSpPr>
+      <p:grpSpPr/>
+      <p:sp>
+        <p:nvSpPr>
+          <p:cNvPr id="2" name="Title 1"/>
+          <p:cNvSpPr>
+            <a:spLocks noGrp="1"/>
+          </p:cNvSpPr>
+          <p:nvPr>
+            <p:ph type="title"/>
+          </p:nvPr>
+        </p:nvSpPr>
+        <p:spPr/>
+        <p:txBody>
+          <a:bodyPr/>
+          <a:lstStyle/>
+          <a:p>
+            <a:r>
+              <a:t>Endpoint → REFDB tables, columns, and sources</a:t>
+            </a:r>
+          </a:p>
+        </p:txBody>
+      </p:sp>
+      <p:graphicFrame>
+        <p:nvGraphicFramePr>
+          <p:cNvPr id="3" name="Table 2"/>
+          <p:cNvGraphicFramePr>
+            <a:graphicFrameLocks noGrp="1"/>
+          </p:cNvGraphicFramePr>
+          <p:nvPr/>
+        </p:nvGraphicFramePr>
+        <p:xfrm>
+          <a:off x="274320" y="1188720"/>
+          <a:ext cx="11795760" cy="4754880"/>
+        </p:xfrm>
+        <a:graphic>
+          <a:graphicData uri="http://schemas.openxmlformats.org/drawingml/2006/table">
+            <a:tbl>
+              <a:tblPr firstRow="1" bandRow="1">
+                <a:tableStyleId>{5C22544A-7EE6-4342-B048-85BDC9FD1C3A}</a:tableStyleId>
+              </a:tblPr>
+              <a:tblGrid>
+                <a:gridCol w="2948940"/>
+                <a:gridCol w="2948940"/>
+                <a:gridCol w="2948940"/>
+                <a:gridCol w="2948940"/>
+              </a:tblGrid>
+              <a:tr h="679268">
+                <a:tc>
+                  <a:txBody>
+                    <a:bodyPr/>
+                    <a:lstStyle/>
+                    <a:p>
+                      <a:pPr>
+                        <a:defRPr b="1" sz="1400"/>
+                      </a:pPr>
+                      <a:r>
+                        <a:t>Endpoint</a:t>
+                      </a:r>
+                    </a:p>
+                  </a:txBody>
+                  <a:tcPr/>
+                </a:tc>
+                <a:tc>
+                  <a:txBody>
+                    <a:bodyPr/>
+                    <a:lstStyle/>
+                    <a:p>
+                      <a:pPr>
+                        <a:defRPr b="1" sz="1400"/>
+                      </a:pPr>
+                      <a:r>
+                        <a:t>Final REFDB table(s)</a:t>
+                      </a:r>
+                    </a:p>
+                  </a:txBody>
+                  <a:tcPr/>
+                </a:tc>
+                <a:tc>
+                  <a:txBody>
+                    <a:bodyPr/>
+                    <a:lstStyle/>
+                    <a:p>
+                      <a:pPr>
+                        <a:defRPr b="1" sz="1400"/>
+                      </a:pPr>
+                      <a:r>
+                        <a:t>Key columns populated</a:t>
+                      </a:r>
+                    </a:p>
+                  </a:txBody>
+                  <a:tcPr/>
+                </a:tc>
+                <a:tc>
+                  <a:txBody>
+                    <a:bodyPr/>
+                    <a:lstStyle/>
+                    <a:p>
+                      <a:pPr>
+                        <a:defRPr b="1" sz="1400"/>
+                      </a:pPr>
+                      <a:r>
+                        <a:t>Primary sources</a:t>
+                      </a:r>
+                    </a:p>
+                  </a:txBody>
+                  <a:tcPr/>
+                </a:tc>
+              </a:tr>
+              <a:tr h="679268">
+                <a:tc>
+                  <a:txBody>
+                    <a:bodyPr/>
+                    <a:lstStyle/>
+                    <a:p>
+                      <a:pPr>
+                        <a:defRPr sz="1200"/>
+                      </a:pPr>
+                      <a:r>
+                        <a:t>OnLot</a:t>
+                      </a:r>
+                    </a:p>
+                  </a:txBody>
+                  <a:tcPr/>
+                </a:tc>
+                <a:tc>
+                  <a:txBody>
+                    <a:bodyPr/>
+                    <a:lstStyle/>
+                    <a:p>
+                      <a:pPr>
+                        <a:defRPr sz="1200"/>
+                      </a:pPr>
+                      <a:r>
+                        <a:t>ON_LOT; ON_PROD</a:t>
+                      </a:r>
+                    </a:p>
+                  </a:txBody>
+                  <a:tcPr/>
+                </a:tc>
+                <a:tc>
+                  <a:txBody>
+                    <a:bodyPr/>
+                    <a:lstStyle/>
+                    <a:p>
+                      <a:pPr>
+                        <a:defRPr sz="1200"/>
+                      </a:pPr>
+                      <a:r>
+                        <a:t>lot, mfgLot, product, fab, sourceLot, lotType, maskSet, process, technology, PTI, family</a:t>
+                      </a:r>
+                    </a:p>
+                  </a:txBody>
+                  <a:tcPr/>
+                </a:tc>
+                <a:tc>
+                  <a:txBody>
+                    <a:bodyPr/>
+                    <a:lstStyle/>
+                    <a:p>
+                      <a:pPr>
+                        <a:defRPr sz="1200"/>
+                      </a:pPr>
+                      <a:r>
+                        <a:t>LotG (native+WS), LTM WS (lotType), Data Warehouse (PLM/MfgArea), MES (Torrent/Genesis)</a:t>
+                      </a:r>
+                    </a:p>
+                  </a:txBody>
+                  <a:tcPr/>
+                </a:tc>
+              </a:tr>
+              <a:tr h="679268">
+                <a:tc>
+                  <a:txBody>
+                    <a:bodyPr/>
+                    <a:lstStyle/>
+                    <a:p>
+                      <a:pPr>
+                        <a:defRPr sz="1200"/>
+                      </a:pPr>
+                      <a:r>
+                        <a:t>OnProd</a:t>
+                      </a:r>
+                    </a:p>
+                  </a:txBody>
+                  <a:tcPr/>
+                </a:tc>
+                <a:tc>
+                  <a:txBody>
+                    <a:bodyPr/>
+                    <a:lstStyle/>
+                    <a:p>
+                      <a:pPr>
+                        <a:defRPr sz="1200"/>
+                      </a:pPr>
+                      <a:r>
+                        <a:t>ON_PROD</a:t>
+                      </a:r>
+                    </a:p>
+                  </a:txBody>
+                  <a:tcPr/>
+                </a:tc>
+                <a:tc>
+                  <a:txBody>
+                    <a:bodyPr/>
+                    <a:lstStyle/>
+                    <a:p>
+                      <a:pPr>
+                        <a:defRPr sz="1200"/>
+                      </a:pPr>
+                      <a:r>
+                        <a:t>product, productVersion, family, process, technology, maskSet, fab</a:t>
+                      </a:r>
+                    </a:p>
+                  </a:txBody>
+                  <a:tcPr/>
+                </a:tc>
+                <a:tc>
+                  <a:txBody>
+                    <a:bodyPr/>
+                    <a:lstStyle/>
+                    <a:p>
+                      <a:pPr>
+                        <a:defRPr sz="1200"/>
+                      </a:pPr>
+                      <a:r>
+                        <a:t>MES (Torrent/Genesis), Data Warehouse PLM/MfgArea, LotG</a:t>
+                      </a:r>
+                    </a:p>
+                  </a:txBody>
+                  <a:tcPr/>
+                </a:tc>
+              </a:tr>
+              <a:tr h="679268">
+                <a:tc>
+                  <a:txBody>
+                    <a:bodyPr/>
+                    <a:lstStyle/>
+                    <a:p>
+                      <a:pPr>
+                        <a:defRPr sz="1200"/>
+                      </a:pPr>
+                      <a:r>
+                        <a:t>OnScribe</a:t>
+                      </a:r>
+                    </a:p>
+                  </a:txBody>
+                  <a:tcPr/>
+                </a:tc>
+                <a:tc>
+                  <a:txBody>
+                    <a:bodyPr/>
+                    <a:lstStyle/>
+                    <a:p>
+                      <a:pPr>
+                        <a:defRPr sz="1200"/>
+                      </a:pPr>
+                      <a:r>
+                        <a:t>ON_SCRIBE</a:t>
+                      </a:r>
+                    </a:p>
+                  </a:txBody>
+                  <a:tcPr/>
+                </a:tc>
+                <a:tc>
+                  <a:txBody>
+                    <a:bodyPr/>
+                    <a:lstStyle/>
+                    <a:p>
+                      <a:pPr>
+                        <a:defRPr sz="1200"/>
+                      </a:pPr>
+                      <a:r>
+                        <a:t>lot, waferNum, waferId, scribeId, insertTime, status</a:t>
+                      </a:r>
+                    </a:p>
+                  </a:txBody>
+                  <a:tcPr/>
+                </a:tc>
+                <a:tc>
+                  <a:txBody>
+                    <a:bodyPr/>
+                    <a:lstStyle/>
+                    <a:p>
+                      <a:pPr>
+                        <a:defRPr sz="1200"/>
+                      </a:pPr>
+                      <a:r>
+                        <a:t>VID↔SCRIBE services (fab-configured); calculated fallback via AttributeUtils; OnLot cache for sourceLot context</a:t>
+                      </a:r>
+                    </a:p>
+                  </a:txBody>
+                  <a:tcPr/>
+                </a:tc>
+              </a:tr>
+              <a:tr h="679268">
+                <a:tc>
+                  <a:txBody>
+                    <a:bodyPr/>
+                    <a:lstStyle/>
+                    <a:p>
+                      <a:pPr>
+                        <a:defRPr sz="1200"/>
+                      </a:pPr>
+                      <a:r>
+                        <a:t>OnSlice</a:t>
+                      </a:r>
+                    </a:p>
+                  </a:txBody>
+                  <a:tcPr/>
+                </a:tc>
+                <a:tc>
+                  <a:txBody>
+                    <a:bodyPr/>
+                    <a:lstStyle/>
+                    <a:p>
+                      <a:pPr>
+                        <a:defRPr sz="1200"/>
+                      </a:pPr>
+                      <a:r>
+                        <a:t>ON_SLICE</a:t>
+                      </a:r>
+                    </a:p>
+                  </a:txBody>
+                  <a:tcPr/>
+                </a:tc>
+                <a:tc>
+                  <a:txBody>
+                    <a:bodyPr/>
+                    <a:lstStyle/>
+                    <a:p>
+                      <a:pPr>
+                        <a:defRPr sz="1200"/>
+                      </a:pPr>
+                      <a:r>
+                        <a:t>slice, globalWaferId, puckId, runId, sliceSourceLot, startLot, fabWaferId, fabSourceLot, slicePartname, sliceLottype, sliceSupplierId, puckHeight, sliceOrder, sliceStartTime</a:t>
+                      </a:r>
+                    </a:p>
+                  </a:txBody>
+                  <a:tcPr/>
+                </a:tc>
+                <a:tc>
+                  <a:txBody>
+                    <a:bodyPr/>
+                    <a:lstStyle/>
+                    <a:p>
+                      <a:pPr>
+                        <a:defRPr sz="1200"/>
+                      </a:pPr>
+                      <a:r>
+                        <a:t>Primary writes via admin DTO/API; upstream ingestion uses BIWMES+eCofA+TORRENT to populate/maintain rows</a:t>
+                      </a:r>
+                    </a:p>
+                  </a:txBody>
+                  <a:tcPr/>
+                </a:tc>
+              </a:tr>
+              <a:tr h="679268">
+                <a:tc>
+                  <a:txBody>
+                    <a:bodyPr/>
+                    <a:lstStyle/>
+                    <a:p>
+                      <a:pPr>
+                        <a:defRPr sz="1200"/>
+                      </a:pPr>
+                      <a:r>
+                        <a:t>OnWmap</a:t>
+                      </a:r>
+                    </a:p>
+                  </a:txBody>
+                  <a:tcPr/>
+                </a:tc>
+                <a:tc>
+                  <a:txBody>
+                    <a:bodyPr/>
+                    <a:lstStyle/>
+                    <a:p>
+                      <a:pPr>
+                        <a:defRPr sz="1200"/>
+                      </a:pPr>
+                      <a:r>
+                        <a:t>ON_WMAP</a:t>
+                      </a:r>
+                    </a:p>
+                  </a:txBody>
+                  <a:tcPr/>
+                </a:tc>
+                <a:tc>
+                  <a:txBody>
+                    <a:bodyPr/>
+                    <a:lstStyle/>
+                    <a:p>
+                      <a:pPr>
+                        <a:defRPr sz="1200"/>
+                      </a:pPr>
+                      <a:r>
+                        <a:t>idWaferMapConfiguration, product/device mapping, metadata per WMC</a:t>
+                      </a:r>
+                    </a:p>
+                  </a:txBody>
+                  <a:tcPr/>
+                </a:tc>
+                <a:tc>
+                  <a:txBody>
+                    <a:bodyPr/>
+                    <a:lstStyle/>
+                    <a:p>
+                      <a:pPr>
+                        <a:defRPr sz="1200"/>
+                      </a:pPr>
+                      <a:r>
+                        <a:t>Matchup service (by lot/scribe) and WMC service (by config/product) via Caller</a:t>
+                      </a:r>
+                    </a:p>
+                  </a:txBody>
+                  <a:tcPr/>
+                </a:tc>
+              </a:tr>
+              <a:tr h="679272">
+                <a:tc>
+                  <a:txBody>
+                    <a:bodyPr/>
+                    <a:lstStyle/>
+                    <a:p>
+                      <a:pPr>
+                        <a:defRPr sz="1200"/>
+                      </a:pPr>
+                      <a:r>
+                        <a:t>PP_LOTPROD (context)</a:t>
+                      </a:r>
+                    </a:p>
+                  </a:txBody>
+                  <a:tcPr/>
+                </a:tc>
+                <a:tc>
+                  <a:txBody>
+                    <a:bodyPr/>
+                    <a:lstStyle/>
+                    <a:p>
+                      <a:pPr>
+                        <a:defRPr sz="1200"/>
+                      </a:pPr>
+                      <a:r>
+                        <a:t>PP_LOTPROD</a:t>
+                      </a:r>
+                    </a:p>
+                  </a:txBody>
+                  <a:tcPr/>
+                </a:tc>
+                <a:tc>
+                  <a:txBody>
+                    <a:bodyPr/>
+                    <a:lstStyle/>
+                    <a:p>
+                      <a:pPr>
+                        <a:defRPr sz="1200"/>
+                      </a:pPr>
+                      <a:r>
+                        <a:t>lot, product, fab (frontend provenance)</a:t>
+                      </a:r>
+                    </a:p>
+                  </a:txBody>
+                  <a:tcPr/>
+                </a:tc>
+                <a:tc>
+                  <a:txBody>
+                    <a:bodyPr/>
+                    <a:lstStyle/>
+                    <a:p>
+                      <a:pPr>
+                        <a:defRPr sz="1200"/>
+                      </a:pPr>
+                      <a:r>
+                        <a:t>Internal PP_LOTPROD DB exposed via /api/pplotprod/bylotid; consumed by ingestion scripts</a:t>
+                      </a:r>
+                    </a:p>
+                  </a:txBody>
+                  <a:tcPr/>
+                </a:tc>
+              </a:tr>
+            </a:tbl>
+          </a:graphicData>
+        </a:graphic>
+      </p:graphicFrame>
     </p:spTree>
   </p:cSld>
   <p:clrMapOvr>

</xml_diff>

<commit_message>
Deck: add per-column source precedence slides for OnLot/OnProd/OnScribe/OnSlice/OnWmap
</commit_message>
<xml_diff>
--- a/docs/refb-endpoints-data-sources.pptx
+++ b/docs/refb-endpoints-data-sources.pptx
@@ -14,6 +14,11 @@
     <p:sldId id="262" r:id="rId13"/>
     <p:sldId id="263" r:id="rId14"/>
     <p:sldId id="264" r:id="rId15"/>
+    <p:sldId id="265" r:id="rId16"/>
+    <p:sldId id="266" r:id="rId17"/>
+    <p:sldId id="267" r:id="rId18"/>
+    <p:sldId id="268" r:id="rId19"/>
+    <p:sldId id="269" r:id="rId20"/>
   </p:sldIdLst>
   <p:sldSz cx="9144000" cy="6858000" type="screen4x3"/>
   <p:notesSz cx="6858000" cy="9144000"/>
@@ -3146,6 +3151,1663 @@
 </p:sld>
 </file>
 
+<file path=ppt/slides/slide10.xml><?xml version="1.0" encoding="utf-8"?>
+<p:sld xmlns:a="http://schemas.openxmlformats.org/drawingml/2006/main" xmlns:p="http://schemas.openxmlformats.org/presentationml/2006/main" xmlns:r="http://schemas.openxmlformats.org/officeDocument/2006/relationships">
+  <p:cSld>
+    <p:spTree>
+      <p:nvGrpSpPr>
+        <p:cNvPr id="1" name=""/>
+        <p:cNvGrpSpPr/>
+        <p:nvPr/>
+      </p:nvGrpSpPr>
+      <p:grpSpPr/>
+      <p:sp>
+        <p:nvSpPr>
+          <p:cNvPr id="2" name="Title 1"/>
+          <p:cNvSpPr>
+            <a:spLocks noGrp="1"/>
+          </p:cNvSpPr>
+          <p:nvPr>
+            <p:ph type="title"/>
+          </p:nvPr>
+        </p:nvSpPr>
+        <p:spPr/>
+        <p:txBody>
+          <a:bodyPr/>
+          <a:lstStyle/>
+          <a:p>
+            <a:r>
+              <a:t>OnProd: per-column source precedence</a:t>
+            </a:r>
+          </a:p>
+        </p:txBody>
+      </p:sp>
+      <p:graphicFrame>
+        <p:nvGraphicFramePr>
+          <p:cNvPr id="3" name="Table 2"/>
+          <p:cNvGraphicFramePr>
+            <a:graphicFrameLocks noGrp="1"/>
+          </p:cNvGraphicFramePr>
+          <p:nvPr/>
+        </p:nvGraphicFramePr>
+        <p:xfrm>
+          <a:off x="457200" y="1188720"/>
+          <a:ext cx="11430000" cy="4572000"/>
+        </p:xfrm>
+        <a:graphic>
+          <a:graphicData uri="http://schemas.openxmlformats.org/drawingml/2006/table">
+            <a:tbl>
+              <a:tblPr firstRow="1" bandRow="1">
+                <a:tableStyleId>{5C22544A-7EE6-4342-B048-85BDC9FD1C3A}</a:tableStyleId>
+              </a:tblPr>
+              <a:tblGrid>
+                <a:gridCol w="5715000"/>
+                <a:gridCol w="5715000"/>
+              </a:tblGrid>
+              <a:tr h="571500">
+                <a:tc>
+                  <a:txBody>
+                    <a:bodyPr/>
+                    <a:lstStyle/>
+                    <a:p>
+                      <a:pPr>
+                        <a:defRPr b="1" sz="1400"/>
+                      </a:pPr>
+                      <a:r>
+                        <a:t>Column</a:t>
+                      </a:r>
+                    </a:p>
+                  </a:txBody>
+                  <a:tcPr/>
+                </a:tc>
+                <a:tc>
+                  <a:txBody>
+                    <a:bodyPr/>
+                    <a:lstStyle/>
+                    <a:p>
+                      <a:pPr>
+                        <a:defRPr b="1" sz="1400"/>
+                      </a:pPr>
+                      <a:r>
+                        <a:t>Source precedence</a:t>
+                      </a:r>
+                    </a:p>
+                  </a:txBody>
+                  <a:tcPr/>
+                </a:tc>
+              </a:tr>
+              <a:tr h="571500">
+                <a:tc>
+                  <a:txBody>
+                    <a:bodyPr/>
+                    <a:lstStyle/>
+                    <a:p>
+                      <a:pPr>
+                        <a:defRPr sz="1200"/>
+                      </a:pPr>
+                      <a:r>
+                        <a:t>product</a:t>
+                      </a:r>
+                    </a:p>
+                  </a:txBody>
+                  <a:tcPr/>
+                </a:tc>
+                <a:tc>
+                  <a:txBody>
+                    <a:bodyPr/>
+                    <a:lstStyle/>
+                    <a:p>
+                      <a:pPr>
+                        <a:defRPr sz="1200"/>
+                      </a:pPr>
+                      <a:r>
+                        <a:t>MES.product &gt; DW.PLM.partId &gt; LotG.waferPartAlternateProduct</a:t>
+                      </a:r>
+                    </a:p>
+                  </a:txBody>
+                  <a:tcPr/>
+                </a:tc>
+              </a:tr>
+              <a:tr h="571500">
+                <a:tc>
+                  <a:txBody>
+                    <a:bodyPr/>
+                    <a:lstStyle/>
+                    <a:p>
+                      <a:pPr>
+                        <a:defRPr sz="1200"/>
+                      </a:pPr>
+                      <a:r>
+                        <a:t>productVersion</a:t>
+                      </a:r>
+                    </a:p>
+                  </a:txBody>
+                  <a:tcPr/>
+                </a:tc>
+                <a:tc>
+                  <a:txBody>
+                    <a:bodyPr/>
+                    <a:lstStyle/>
+                    <a:p>
+                      <a:pPr>
+                        <a:defRPr sz="1200"/>
+                      </a:pPr>
+                      <a:r>
+                        <a:t>MES.productVersion &gt; existing</a:t>
+                      </a:r>
+                    </a:p>
+                  </a:txBody>
+                  <a:tcPr/>
+                </a:tc>
+              </a:tr>
+              <a:tr h="571500">
+                <a:tc>
+                  <a:txBody>
+                    <a:bodyPr/>
+                    <a:lstStyle/>
+                    <a:p>
+                      <a:pPr>
+                        <a:defRPr sz="1200"/>
+                      </a:pPr>
+                      <a:r>
+                        <a:t>family</a:t>
+                      </a:r>
+                    </a:p>
+                  </a:txBody>
+                  <a:tcPr/>
+                </a:tc>
+                <a:tc>
+                  <a:txBody>
+                    <a:bodyPr/>
+                    <a:lstStyle/>
+                    <a:p>
+                      <a:pPr>
+                        <a:defRPr sz="1200"/>
+                      </a:pPr>
+                      <a:r>
+                        <a:t>MES.family &gt; DW</a:t>
+                      </a:r>
+                    </a:p>
+                  </a:txBody>
+                  <a:tcPr/>
+                </a:tc>
+              </a:tr>
+              <a:tr h="571500">
+                <a:tc>
+                  <a:txBody>
+                    <a:bodyPr/>
+                    <a:lstStyle/>
+                    <a:p>
+                      <a:pPr>
+                        <a:defRPr sz="1200"/>
+                      </a:pPr>
+                      <a:r>
+                        <a:t>process</a:t>
+                      </a:r>
+                    </a:p>
+                  </a:txBody>
+                  <a:tcPr/>
+                </a:tc>
+                <a:tc>
+                  <a:txBody>
+                    <a:bodyPr/>
+                    <a:lstStyle/>
+                    <a:p>
+                      <a:pPr>
+                        <a:defRPr sz="1200"/>
+                      </a:pPr>
+                      <a:r>
+                        <a:t>MES.process &gt; DW</a:t>
+                      </a:r>
+                    </a:p>
+                  </a:txBody>
+                  <a:tcPr/>
+                </a:tc>
+              </a:tr>
+              <a:tr h="571500">
+                <a:tc>
+                  <a:txBody>
+                    <a:bodyPr/>
+                    <a:lstStyle/>
+                    <a:p>
+                      <a:pPr>
+                        <a:defRPr sz="1200"/>
+                      </a:pPr>
+                      <a:r>
+                        <a:t>technology</a:t>
+                      </a:r>
+                    </a:p>
+                  </a:txBody>
+                  <a:tcPr/>
+                </a:tc>
+                <a:tc>
+                  <a:txBody>
+                    <a:bodyPr/>
+                    <a:lstStyle/>
+                    <a:p>
+                      <a:pPr>
+                        <a:defRPr sz="1200"/>
+                      </a:pPr>
+                      <a:r>
+                        <a:t>MES.technology &gt; DW</a:t>
+                      </a:r>
+                    </a:p>
+                  </a:txBody>
+                  <a:tcPr/>
+                </a:tc>
+              </a:tr>
+              <a:tr h="571500">
+                <a:tc>
+                  <a:txBody>
+                    <a:bodyPr/>
+                    <a:lstStyle/>
+                    <a:p>
+                      <a:pPr>
+                        <a:defRPr sz="1200"/>
+                      </a:pPr>
+                      <a:r>
+                        <a:t>maskSet</a:t>
+                      </a:r>
+                    </a:p>
+                  </a:txBody>
+                  <a:tcPr/>
+                </a:tc>
+                <a:tc>
+                  <a:txBody>
+                    <a:bodyPr/>
+                    <a:lstStyle/>
+                    <a:p>
+                      <a:pPr>
+                        <a:defRPr sz="1200"/>
+                      </a:pPr>
+                      <a:r>
+                        <a:t>MES.maskSet &gt; DW.PLM.MASK_SET</a:t>
+                      </a:r>
+                    </a:p>
+                  </a:txBody>
+                  <a:tcPr/>
+                </a:tc>
+              </a:tr>
+              <a:tr h="571500">
+                <a:tc>
+                  <a:txBody>
+                    <a:bodyPr/>
+                    <a:lstStyle/>
+                    <a:p>
+                      <a:pPr>
+                        <a:defRPr sz="1200"/>
+                      </a:pPr>
+                      <a:r>
+                        <a:t>fab</a:t>
+                      </a:r>
+                    </a:p>
+                  </a:txBody>
+                  <a:tcPr/>
+                </a:tc>
+                <a:tc>
+                  <a:txBody>
+                    <a:bodyPr/>
+                    <a:lstStyle/>
+                    <a:p>
+                      <a:pPr>
+                        <a:defRPr sz="1200"/>
+                      </a:pPr>
+                      <a:r>
+                        <a:t>MES.fab &gt; DW/ LotG</a:t>
+                      </a:r>
+                    </a:p>
+                  </a:txBody>
+                  <a:tcPr/>
+                </a:tc>
+              </a:tr>
+            </a:tbl>
+          </a:graphicData>
+        </a:graphic>
+      </p:graphicFrame>
+    </p:spTree>
+  </p:cSld>
+  <p:clrMapOvr>
+    <a:masterClrMapping/>
+  </p:clrMapOvr>
+</p:sld>
+</file>
+
+<file path=ppt/slides/slide11.xml><?xml version="1.0" encoding="utf-8"?>
+<p:sld xmlns:a="http://schemas.openxmlformats.org/drawingml/2006/main" xmlns:p="http://schemas.openxmlformats.org/presentationml/2006/main" xmlns:r="http://schemas.openxmlformats.org/officeDocument/2006/relationships">
+  <p:cSld>
+    <p:spTree>
+      <p:nvGrpSpPr>
+        <p:cNvPr id="1" name=""/>
+        <p:cNvGrpSpPr/>
+        <p:nvPr/>
+      </p:nvGrpSpPr>
+      <p:grpSpPr/>
+      <p:sp>
+        <p:nvSpPr>
+          <p:cNvPr id="2" name="Title 1"/>
+          <p:cNvSpPr>
+            <a:spLocks noGrp="1"/>
+          </p:cNvSpPr>
+          <p:nvPr>
+            <p:ph type="title"/>
+          </p:nvPr>
+        </p:nvSpPr>
+        <p:spPr/>
+        <p:txBody>
+          <a:bodyPr/>
+          <a:lstStyle/>
+          <a:p>
+            <a:r>
+              <a:t>OnScribe: per-column source precedence</a:t>
+            </a:r>
+          </a:p>
+        </p:txBody>
+      </p:sp>
+      <p:graphicFrame>
+        <p:nvGraphicFramePr>
+          <p:cNvPr id="3" name="Table 2"/>
+          <p:cNvGraphicFramePr>
+            <a:graphicFrameLocks noGrp="1"/>
+          </p:cNvGraphicFramePr>
+          <p:nvPr/>
+        </p:nvGraphicFramePr>
+        <p:xfrm>
+          <a:off x="457200" y="1188720"/>
+          <a:ext cx="11430000" cy="4572000"/>
+        </p:xfrm>
+        <a:graphic>
+          <a:graphicData uri="http://schemas.openxmlformats.org/drawingml/2006/table">
+            <a:tbl>
+              <a:tblPr firstRow="1" bandRow="1">
+                <a:tableStyleId>{5C22544A-7EE6-4342-B048-85BDC9FD1C3A}</a:tableStyleId>
+              </a:tblPr>
+              <a:tblGrid>
+                <a:gridCol w="5715000"/>
+                <a:gridCol w="5715000"/>
+              </a:tblGrid>
+              <a:tr h="653142">
+                <a:tc>
+                  <a:txBody>
+                    <a:bodyPr/>
+                    <a:lstStyle/>
+                    <a:p>
+                      <a:pPr>
+                        <a:defRPr b="1" sz="1400"/>
+                      </a:pPr>
+                      <a:r>
+                        <a:t>Column</a:t>
+                      </a:r>
+                    </a:p>
+                  </a:txBody>
+                  <a:tcPr/>
+                </a:tc>
+                <a:tc>
+                  <a:txBody>
+                    <a:bodyPr/>
+                    <a:lstStyle/>
+                    <a:p>
+                      <a:pPr>
+                        <a:defRPr b="1" sz="1400"/>
+                      </a:pPr>
+                      <a:r>
+                        <a:t>Source precedence</a:t>
+                      </a:r>
+                    </a:p>
+                  </a:txBody>
+                  <a:tcPr/>
+                </a:tc>
+              </a:tr>
+              <a:tr h="653142">
+                <a:tc>
+                  <a:txBody>
+                    <a:bodyPr/>
+                    <a:lstStyle/>
+                    <a:p>
+                      <a:pPr>
+                        <a:defRPr sz="1200"/>
+                      </a:pPr>
+                      <a:r>
+                        <a:t>waferId</a:t>
+                      </a:r>
+                    </a:p>
+                  </a:txBody>
+                  <a:tcPr/>
+                </a:tc>
+                <a:tc>
+                  <a:txBody>
+                    <a:bodyPr/>
+                    <a:lstStyle/>
+                    <a:p>
+                      <a:pPr>
+                        <a:defRPr sz="1200"/>
+                      </a:pPr>
+                      <a:r>
+                        <a:t>VID→SCRIBE service success &gt; AttributeUtils.calculateWaferId (fallback)</a:t>
+                      </a:r>
+                    </a:p>
+                  </a:txBody>
+                  <a:tcPr/>
+                </a:tc>
+              </a:tr>
+              <a:tr h="653142">
+                <a:tc>
+                  <a:txBody>
+                    <a:bodyPr/>
+                    <a:lstStyle/>
+                    <a:p>
+                      <a:pPr>
+                        <a:defRPr sz="1200"/>
+                      </a:pPr>
+                      <a:r>
+                        <a:t>scribeId</a:t>
+                      </a:r>
+                    </a:p>
+                  </a:txBody>
+                  <a:tcPr/>
+                </a:tc>
+                <a:tc>
+                  <a:txBody>
+                    <a:bodyPr/>
+                    <a:lstStyle/>
+                    <a:p>
+                      <a:pPr>
+                        <a:defRPr sz="1200"/>
+                      </a:pPr>
+                      <a:r>
+                        <a:t>VID payload laser-scribe; if onScribeWaferIdEqualsScribeId=true then waferId</a:t>
+                      </a:r>
+                    </a:p>
+                  </a:txBody>
+                  <a:tcPr/>
+                </a:tc>
+              </a:tr>
+              <a:tr h="653142">
+                <a:tc>
+                  <a:txBody>
+                    <a:bodyPr/>
+                    <a:lstStyle/>
+                    <a:p>
+                      <a:pPr>
+                        <a:defRPr sz="1200"/>
+                      </a:pPr>
+                      <a:r>
+                        <a:t>lot</a:t>
+                      </a:r>
+                    </a:p>
+                  </a:txBody>
+                  <a:tcPr/>
+                </a:tc>
+                <a:tc>
+                  <a:txBody>
+                    <a:bodyPr/>
+                    <a:lstStyle/>
+                    <a:p>
+                      <a:pPr>
+                        <a:defRPr sz="1200"/>
+                      </a:pPr>
+                      <a:r>
+                        <a:t>From request; production vs manufacturing chosen by OnFabConf.LotIdForOnScribeType</a:t>
+                      </a:r>
+                    </a:p>
+                  </a:txBody>
+                  <a:tcPr/>
+                </a:tc>
+              </a:tr>
+              <a:tr h="653142">
+                <a:tc>
+                  <a:txBody>
+                    <a:bodyPr/>
+                    <a:lstStyle/>
+                    <a:p>
+                      <a:pPr>
+                        <a:defRPr sz="1200"/>
+                      </a:pPr>
+                      <a:r>
+                        <a:t>waferNum</a:t>
+                      </a:r>
+                    </a:p>
+                  </a:txBody>
+                  <a:tcPr/>
+                </a:tc>
+                <a:tc>
+                  <a:txBody>
+                    <a:bodyPr/>
+                    <a:lstStyle/>
+                    <a:p>
+                      <a:pPr>
+                        <a:defRPr sz="1200"/>
+                      </a:pPr>
+                      <a:r>
+                        <a:t>From request (validated)</a:t>
+                      </a:r>
+                    </a:p>
+                  </a:txBody>
+                  <a:tcPr/>
+                </a:tc>
+              </a:tr>
+              <a:tr h="653142">
+                <a:tc>
+                  <a:txBody>
+                    <a:bodyPr/>
+                    <a:lstStyle/>
+                    <a:p>
+                      <a:pPr>
+                        <a:defRPr sz="1200"/>
+                      </a:pPr>
+                      <a:r>
+                        <a:t>status</a:t>
+                      </a:r>
+                    </a:p>
+                  </a:txBody>
+                  <a:tcPr/>
+                </a:tc>
+                <a:tc>
+                  <a:txBody>
+                    <a:bodyPr/>
+                    <a:lstStyle/>
+                    <a:p>
+                      <a:pPr>
+                        <a:defRPr sz="1200"/>
+                      </a:pPr>
+                      <a:r>
+                        <a:t>Computed: FOUND | NO_DATA | ERROR; MANUAL not overwritten</a:t>
+                      </a:r>
+                    </a:p>
+                  </a:txBody>
+                  <a:tcPr/>
+                </a:tc>
+              </a:tr>
+              <a:tr h="653148">
+                <a:tc>
+                  <a:txBody>
+                    <a:bodyPr/>
+                    <a:lstStyle/>
+                    <a:p>
+                      <a:pPr>
+                        <a:defRPr sz="1200"/>
+                      </a:pPr>
+                      <a:r>
+                        <a:t>insertTime</a:t>
+                      </a:r>
+                    </a:p>
+                  </a:txBody>
+                  <a:tcPr/>
+                </a:tc>
+                <a:tc>
+                  <a:txBody>
+                    <a:bodyPr/>
+                    <a:lstStyle/>
+                    <a:p>
+                      <a:pPr>
+                        <a:defRPr sz="1200"/>
+                      </a:pPr>
+                      <a:r>
+                        <a:t>Set on persist</a:t>
+                      </a:r>
+                    </a:p>
+                  </a:txBody>
+                  <a:tcPr/>
+                </a:tc>
+              </a:tr>
+            </a:tbl>
+          </a:graphicData>
+        </a:graphic>
+      </p:graphicFrame>
+    </p:spTree>
+  </p:cSld>
+  <p:clrMapOvr>
+    <a:masterClrMapping/>
+  </p:clrMapOvr>
+</p:sld>
+</file>
+
+<file path=ppt/slides/slide12.xml><?xml version="1.0" encoding="utf-8"?>
+<p:sld xmlns:a="http://schemas.openxmlformats.org/drawingml/2006/main" xmlns:p="http://schemas.openxmlformats.org/presentationml/2006/main" xmlns:r="http://schemas.openxmlformats.org/officeDocument/2006/relationships">
+  <p:cSld>
+    <p:spTree>
+      <p:nvGrpSpPr>
+        <p:cNvPr id="1" name=""/>
+        <p:cNvGrpSpPr/>
+        <p:nvPr/>
+      </p:nvGrpSpPr>
+      <p:grpSpPr/>
+      <p:sp>
+        <p:nvSpPr>
+          <p:cNvPr id="2" name="Title 1"/>
+          <p:cNvSpPr>
+            <a:spLocks noGrp="1"/>
+          </p:cNvSpPr>
+          <p:nvPr>
+            <p:ph type="title"/>
+          </p:nvPr>
+        </p:nvSpPr>
+        <p:spPr/>
+        <p:txBody>
+          <a:bodyPr/>
+          <a:lstStyle/>
+          <a:p>
+            <a:r>
+              <a:t>OnSlice: per-column source precedence</a:t>
+            </a:r>
+          </a:p>
+        </p:txBody>
+      </p:sp>
+      <p:graphicFrame>
+        <p:nvGraphicFramePr>
+          <p:cNvPr id="3" name="Table 2"/>
+          <p:cNvGraphicFramePr>
+            <a:graphicFrameLocks noGrp="1"/>
+          </p:cNvGraphicFramePr>
+          <p:nvPr/>
+        </p:nvGraphicFramePr>
+        <p:xfrm>
+          <a:off x="457200" y="1188720"/>
+          <a:ext cx="11430000" cy="4572000"/>
+        </p:xfrm>
+        <a:graphic>
+          <a:graphicData uri="http://schemas.openxmlformats.org/drawingml/2006/table">
+            <a:tbl>
+              <a:tblPr firstRow="1" bandRow="1">
+                <a:tableStyleId>{5C22544A-7EE6-4342-B048-85BDC9FD1C3A}</a:tableStyleId>
+              </a:tblPr>
+              <a:tblGrid>
+                <a:gridCol w="5715000"/>
+                <a:gridCol w="5715000"/>
+              </a:tblGrid>
+              <a:tr h="508000">
+                <a:tc>
+                  <a:txBody>
+                    <a:bodyPr/>
+                    <a:lstStyle/>
+                    <a:p>
+                      <a:pPr>
+                        <a:defRPr b="1" sz="1400"/>
+                      </a:pPr>
+                      <a:r>
+                        <a:t>Column</a:t>
+                      </a:r>
+                    </a:p>
+                  </a:txBody>
+                  <a:tcPr/>
+                </a:tc>
+                <a:tc>
+                  <a:txBody>
+                    <a:bodyPr/>
+                    <a:lstStyle/>
+                    <a:p>
+                      <a:pPr>
+                        <a:defRPr b="1" sz="1400"/>
+                      </a:pPr>
+                      <a:r>
+                        <a:t>Source precedence</a:t>
+                      </a:r>
+                    </a:p>
+                  </a:txBody>
+                  <a:tcPr/>
+                </a:tc>
+              </a:tr>
+              <a:tr h="508000">
+                <a:tc>
+                  <a:txBody>
+                    <a:bodyPr/>
+                    <a:lstStyle/>
+                    <a:p>
+                      <a:pPr>
+                        <a:defRPr sz="1200"/>
+                      </a:pPr>
+                      <a:r>
+                        <a:t>globalWaferId</a:t>
+                      </a:r>
+                    </a:p>
+                  </a:txBody>
+                  <a:tcPr/>
+                </a:tc>
+                <a:tc>
+                  <a:txBody>
+                    <a:bodyPr/>
+                    <a:lstStyle/>
+                    <a:p>
+                      <a:pPr>
+                        <a:defRPr sz="1200"/>
+                      </a:pPr>
+                      <a:r>
+                        <a:t>REFDB existing &gt; eCofA.GWID &gt; guessed from slice (strip dashes/truncate)</a:t>
+                      </a:r>
+                    </a:p>
+                  </a:txBody>
+                  <a:tcPr/>
+                </a:tc>
+              </a:tr>
+              <a:tr h="508000">
+                <a:tc>
+                  <a:txBody>
+                    <a:bodyPr/>
+                    <a:lstStyle/>
+                    <a:p>
+                      <a:pPr>
+                        <a:defRPr sz="1200"/>
+                      </a:pPr>
+                      <a:r>
+                        <a:t>puckId</a:t>
+                      </a:r>
+                    </a:p>
+                  </a:txBody>
+                  <a:tcPr/>
+                </a:tc>
+                <a:tc>
+                  <a:txBody>
+                    <a:bodyPr/>
+                    <a:lstStyle/>
+                    <a:p>
+                      <a:pPr>
+                        <a:defRPr sz="1200"/>
+                      </a:pPr>
+                      <a:r>
+                        <a:t>REFDB.PUCK_ID &gt; derived from slice/vendor rules (non-GTAT → puck; GTAT → runId logic)</a:t>
+                      </a:r>
+                    </a:p>
+                  </a:txBody>
+                  <a:tcPr/>
+                </a:tc>
+              </a:tr>
+              <a:tr h="508000">
+                <a:tc>
+                  <a:txBody>
+                    <a:bodyPr/>
+                    <a:lstStyle/>
+                    <a:p>
+                      <a:pPr>
+                        <a:defRPr sz="1200"/>
+                      </a:pPr>
+                      <a:r>
+                        <a:t>fabWaferId</a:t>
+                      </a:r>
+                    </a:p>
+                  </a:txBody>
+                  <a:tcPr/>
+                </a:tc>
+                <a:tc>
+                  <a:txBody>
+                    <a:bodyPr/>
+                    <a:lstStyle/>
+                    <a:p>
+                      <a:pPr>
+                        <a:defRPr sz="1200"/>
+                      </a:pPr>
+                      <a:r>
+                        <a:t>MES CRLT fab-trace &gt; replace only if missing or CHANGED_WAFERS indicates remap</a:t>
+                      </a:r>
+                    </a:p>
+                  </a:txBody>
+                  <a:tcPr/>
+                </a:tc>
+              </a:tr>
+              <a:tr h="508000">
+                <a:tc>
+                  <a:txBody>
+                    <a:bodyPr/>
+                    <a:lstStyle/>
+                    <a:p>
+                      <a:pPr>
+                        <a:defRPr sz="1200"/>
+                      </a:pPr>
+                      <a:r>
+                        <a:t>fabSourceLot</a:t>
+                      </a:r>
+                    </a:p>
+                  </a:txBody>
+                  <a:tcPr/>
+                </a:tc>
+                <a:tc>
+                  <a:txBody>
+                    <a:bodyPr/>
+                    <a:lstStyle/>
+                    <a:p>
+                      <a:pPr>
+                        <a:defRPr sz="1200"/>
+                      </a:pPr>
+                      <a:r>
+                        <a:t>MES CRLT source lot &gt; write when missing</a:t>
+                      </a:r>
+                    </a:p>
+                  </a:txBody>
+                  <a:tcPr/>
+                </a:tc>
+              </a:tr>
+              <a:tr h="508000">
+                <a:tc>
+                  <a:txBody>
+                    <a:bodyPr/>
+                    <a:lstStyle/>
+                    <a:p>
+                      <a:pPr>
+                        <a:defRPr sz="1200"/>
+                      </a:pPr>
+                      <a:r>
+                        <a:t>sliceOrder</a:t>
+                      </a:r>
+                    </a:p>
+                  </a:txBody>
+                  <a:tcPr/>
+                </a:tc>
+                <a:tc>
+                  <a:txBody>
+                    <a:bodyPr/>
+                    <a:lstStyle/>
+                    <a:p>
+                      <a:pPr>
+                        <a:defRPr sz="1200"/>
+                      </a:pPr>
+                      <a:r>
+                        <a:t>REFDB.SLICE_ORDER &gt; eCofA slice order</a:t>
+                      </a:r>
+                    </a:p>
+                  </a:txBody>
+                  <a:tcPr/>
+                </a:tc>
+              </a:tr>
+              <a:tr h="508000">
+                <a:tc>
+                  <a:txBody>
+                    <a:bodyPr/>
+                    <a:lstStyle/>
+                    <a:p>
+                      <a:pPr>
+                        <a:defRPr sz="1200"/>
+                      </a:pPr>
+                      <a:r>
+                        <a:t>sliceLottype</a:t>
+                      </a:r>
+                    </a:p>
+                  </a:txBody>
+                  <a:tcPr/>
+                </a:tc>
+                <a:tc>
+                  <a:txBody>
+                    <a:bodyPr/>
+                    <a:lstStyle/>
+                    <a:p>
+                      <a:pPr>
+                        <a:defRPr sz="1200"/>
+                      </a:pPr>
+                      <a:r>
+                        <a:t>fab-trace lot_type when missing &gt; existing</a:t>
+                      </a:r>
+                    </a:p>
+                  </a:txBody>
+                  <a:tcPr/>
+                </a:tc>
+              </a:tr>
+              <a:tr h="508000">
+                <a:tc>
+                  <a:txBody>
+                    <a:bodyPr/>
+                    <a:lstStyle/>
+                    <a:p>
+                      <a:pPr>
+                        <a:defRPr sz="1200"/>
+                      </a:pPr>
+                      <a:r>
+                        <a:t>slicePartname</a:t>
+                      </a:r>
+                    </a:p>
+                  </a:txBody>
+                  <a:tcPr/>
+                </a:tc>
+                <a:tc>
+                  <a:txBody>
+                    <a:bodyPr/>
+                    <a:lstStyle/>
+                    <a:p>
+                      <a:pPr>
+                        <a:defRPr sz="1200"/>
+                      </a:pPr>
+                      <a:r>
+                        <a:t>REFDB.slice_partname &gt; Maine EPI product &gt; existing</a:t>
+                      </a:r>
+                    </a:p>
+                  </a:txBody>
+                  <a:tcPr/>
+                </a:tc>
+              </a:tr>
+              <a:tr h="508000">
+                <a:tc>
+                  <a:txBody>
+                    <a:bodyPr/>
+                    <a:lstStyle/>
+                    <a:p>
+                      <a:pPr>
+                        <a:defRPr sz="1200"/>
+                      </a:pPr>
+                      <a:r>
+                        <a:t>sliceStartTime</a:t>
+                      </a:r>
+                    </a:p>
+                  </a:txBody>
+                  <a:tcPr/>
+                </a:tc>
+                <a:tc>
+                  <a:txBody>
+                    <a:bodyPr/>
+                    <a:lstStyle/>
+                    <a:p>
+                      <a:pPr>
+                        <a:defRPr sz="1200"/>
+                      </a:pPr>
+                      <a:r>
+                        <a:t>REFDB; filled by ingestion when CZ2/eCofA/TORRENT supply</a:t>
+                      </a:r>
+                    </a:p>
+                  </a:txBody>
+                  <a:tcPr/>
+                </a:tc>
+              </a:tr>
+            </a:tbl>
+          </a:graphicData>
+        </a:graphic>
+      </p:graphicFrame>
+    </p:spTree>
+  </p:cSld>
+  <p:clrMapOvr>
+    <a:masterClrMapping/>
+  </p:clrMapOvr>
+</p:sld>
+</file>
+
+<file path=ppt/slides/slide13.xml><?xml version="1.0" encoding="utf-8"?>
+<p:sld xmlns:a="http://schemas.openxmlformats.org/drawingml/2006/main" xmlns:p="http://schemas.openxmlformats.org/presentationml/2006/main" xmlns:r="http://schemas.openxmlformats.org/officeDocument/2006/relationships">
+  <p:cSld>
+    <p:spTree>
+      <p:nvGrpSpPr>
+        <p:cNvPr id="1" name=""/>
+        <p:cNvGrpSpPr/>
+        <p:nvPr/>
+      </p:nvGrpSpPr>
+      <p:grpSpPr/>
+      <p:sp>
+        <p:nvSpPr>
+          <p:cNvPr id="2" name="Title 1"/>
+          <p:cNvSpPr>
+            <a:spLocks noGrp="1"/>
+          </p:cNvSpPr>
+          <p:nvPr>
+            <p:ph type="title"/>
+          </p:nvPr>
+        </p:nvSpPr>
+        <p:spPr/>
+        <p:txBody>
+          <a:bodyPr/>
+          <a:lstStyle/>
+          <a:p>
+            <a:r>
+              <a:t>OnWmap: per-column source precedence</a:t>
+            </a:r>
+          </a:p>
+        </p:txBody>
+      </p:sp>
+      <p:graphicFrame>
+        <p:nvGraphicFramePr>
+          <p:cNvPr id="3" name="Table 2"/>
+          <p:cNvGraphicFramePr>
+            <a:graphicFrameLocks noGrp="1"/>
+          </p:cNvGraphicFramePr>
+          <p:nvPr/>
+        </p:nvGraphicFramePr>
+        <p:xfrm>
+          <a:off x="457200" y="1188720"/>
+          <a:ext cx="11430000" cy="4572000"/>
+        </p:xfrm>
+        <a:graphic>
+          <a:graphicData uri="http://schemas.openxmlformats.org/drawingml/2006/table">
+            <a:tbl>
+              <a:tblPr firstRow="1" bandRow="1">
+                <a:tableStyleId>{5C22544A-7EE6-4342-B048-85BDC9FD1C3A}</a:tableStyleId>
+              </a:tblPr>
+              <a:tblGrid>
+                <a:gridCol w="5715000"/>
+                <a:gridCol w="5715000"/>
+              </a:tblGrid>
+              <a:tr h="1143000">
+                <a:tc>
+                  <a:txBody>
+                    <a:bodyPr/>
+                    <a:lstStyle/>
+                    <a:p>
+                      <a:pPr>
+                        <a:defRPr b="1" sz="1400"/>
+                      </a:pPr>
+                      <a:r>
+                        <a:t>Column</a:t>
+                      </a:r>
+                    </a:p>
+                  </a:txBody>
+                  <a:tcPr/>
+                </a:tc>
+                <a:tc>
+                  <a:txBody>
+                    <a:bodyPr/>
+                    <a:lstStyle/>
+                    <a:p>
+                      <a:pPr>
+                        <a:defRPr b="1" sz="1400"/>
+                      </a:pPr>
+                      <a:r>
+                        <a:t>Source precedence</a:t>
+                      </a:r>
+                    </a:p>
+                  </a:txBody>
+                  <a:tcPr/>
+                </a:tc>
+              </a:tr>
+              <a:tr h="1143000">
+                <a:tc>
+                  <a:txBody>
+                    <a:bodyPr/>
+                    <a:lstStyle/>
+                    <a:p>
+                      <a:pPr>
+                        <a:defRPr sz="1200"/>
+                      </a:pPr>
+                      <a:r>
+                        <a:t>idWaferMapConfiguration</a:t>
+                      </a:r>
+                    </a:p>
+                  </a:txBody>
+                  <a:tcPr/>
+                </a:tc>
+                <a:tc>
+                  <a:txBody>
+                    <a:bodyPr/>
+                    <a:lstStyle/>
+                    <a:p>
+                      <a:pPr>
+                        <a:defRPr sz="1200"/>
+                      </a:pPr>
+                      <a:r>
+                        <a:t>Matchup by lot/scribe when available &gt; WMC by config/product</a:t>
+                      </a:r>
+                    </a:p>
+                  </a:txBody>
+                  <a:tcPr/>
+                </a:tc>
+              </a:tr>
+              <a:tr h="1143000">
+                <a:tc>
+                  <a:txBody>
+                    <a:bodyPr/>
+                    <a:lstStyle/>
+                    <a:p>
+                      <a:pPr>
+                        <a:defRPr sz="1200"/>
+                      </a:pPr>
+                      <a:r>
+                        <a:t>device/product mapping</a:t>
+                      </a:r>
+                    </a:p>
+                  </a:txBody>
+                  <a:tcPr/>
+                </a:tc>
+                <a:tc>
+                  <a:txBody>
+                    <a:bodyPr/>
+                    <a:lstStyle/>
+                    <a:p>
+                      <a:pPr>
+                        <a:defRPr sz="1200"/>
+                      </a:pPr>
+                      <a:r>
+                        <a:t>WMC by device (serviceKey primary) &gt; WMC by product (PCM fallback)</a:t>
+                      </a:r>
+                    </a:p>
+                  </a:txBody>
+                  <a:tcPr/>
+                </a:tc>
+              </a:tr>
+              <a:tr h="1143000">
+                <a:tc>
+                  <a:txBody>
+                    <a:bodyPr/>
+                    <a:lstStyle/>
+                    <a:p>
+                      <a:pPr>
+                        <a:defRPr sz="1200"/>
+                      </a:pPr>
+                      <a:r>
+                        <a:t>metadata</a:t>
+                      </a:r>
+                    </a:p>
+                  </a:txBody>
+                  <a:tcPr/>
+                </a:tc>
+                <a:tc>
+                  <a:txBody>
+                    <a:bodyPr/>
+                    <a:lstStyle/>
+                    <a:p>
+                      <a:pPr>
+                        <a:defRPr sz="1200"/>
+                      </a:pPr>
+                      <a:r>
+                        <a:t>From WMC payload; cached in ON_WMAP</a:t>
+                      </a:r>
+                    </a:p>
+                  </a:txBody>
+                  <a:tcPr/>
+                </a:tc>
+              </a:tr>
+            </a:tbl>
+          </a:graphicData>
+        </a:graphic>
+      </p:graphicFrame>
+    </p:spTree>
+  </p:cSld>
+  <p:clrMapOvr>
+    <a:masterClrMapping/>
+  </p:clrMapOvr>
+</p:sld>
+</file>
+
+<file path=ppt/slides/slide14.xml><?xml version="1.0" encoding="utf-8"?>
+<p:sld xmlns:a="http://schemas.openxmlformats.org/drawingml/2006/main" xmlns:p="http://schemas.openxmlformats.org/presentationml/2006/main" xmlns:r="http://schemas.openxmlformats.org/officeDocument/2006/relationships">
+  <p:cSld>
+    <p:spTree>
+      <p:nvGrpSpPr>
+        <p:cNvPr id="1" name=""/>
+        <p:cNvGrpSpPr/>
+        <p:nvPr/>
+      </p:nvGrpSpPr>
+      <p:grpSpPr/>
+      <p:sp>
+        <p:nvSpPr>
+          <p:cNvPr id="2" name="Title 1"/>
+          <p:cNvSpPr>
+            <a:spLocks noGrp="1"/>
+          </p:cNvSpPr>
+          <p:nvPr>
+            <p:ph type="title"/>
+          </p:nvPr>
+        </p:nvSpPr>
+        <p:spPr/>
+        <p:txBody>
+          <a:bodyPr/>
+          <a:lstStyle/>
+          <a:p>
+            <a:r>
+              <a:t>Endpoint → REFDB tables, columns, and sources</a:t>
+            </a:r>
+          </a:p>
+        </p:txBody>
+      </p:sp>
+      <p:graphicFrame>
+        <p:nvGraphicFramePr>
+          <p:cNvPr id="3" name="Table 2"/>
+          <p:cNvGraphicFramePr>
+            <a:graphicFrameLocks noGrp="1"/>
+          </p:cNvGraphicFramePr>
+          <p:nvPr/>
+        </p:nvGraphicFramePr>
+        <p:xfrm>
+          <a:off x="274320" y="1188720"/>
+          <a:ext cx="11795760" cy="4754880"/>
+        </p:xfrm>
+        <a:graphic>
+          <a:graphicData uri="http://schemas.openxmlformats.org/drawingml/2006/table">
+            <a:tbl>
+              <a:tblPr firstRow="1" bandRow="1">
+                <a:tableStyleId>{5C22544A-7EE6-4342-B048-85BDC9FD1C3A}</a:tableStyleId>
+              </a:tblPr>
+              <a:tblGrid>
+                <a:gridCol w="2948940"/>
+                <a:gridCol w="2948940"/>
+                <a:gridCol w="2948940"/>
+                <a:gridCol w="2948940"/>
+              </a:tblGrid>
+              <a:tr h="679268">
+                <a:tc>
+                  <a:txBody>
+                    <a:bodyPr/>
+                    <a:lstStyle/>
+                    <a:p>
+                      <a:pPr>
+                        <a:defRPr b="1" sz="1400"/>
+                      </a:pPr>
+                      <a:r>
+                        <a:t>Endpoint</a:t>
+                      </a:r>
+                    </a:p>
+                  </a:txBody>
+                  <a:tcPr/>
+                </a:tc>
+                <a:tc>
+                  <a:txBody>
+                    <a:bodyPr/>
+                    <a:lstStyle/>
+                    <a:p>
+                      <a:pPr>
+                        <a:defRPr b="1" sz="1400"/>
+                      </a:pPr>
+                      <a:r>
+                        <a:t>Final REFDB table(s)</a:t>
+                      </a:r>
+                    </a:p>
+                  </a:txBody>
+                  <a:tcPr/>
+                </a:tc>
+                <a:tc>
+                  <a:txBody>
+                    <a:bodyPr/>
+                    <a:lstStyle/>
+                    <a:p>
+                      <a:pPr>
+                        <a:defRPr b="1" sz="1400"/>
+                      </a:pPr>
+                      <a:r>
+                        <a:t>Key columns populated</a:t>
+                      </a:r>
+                    </a:p>
+                  </a:txBody>
+                  <a:tcPr/>
+                </a:tc>
+                <a:tc>
+                  <a:txBody>
+                    <a:bodyPr/>
+                    <a:lstStyle/>
+                    <a:p>
+                      <a:pPr>
+                        <a:defRPr b="1" sz="1400"/>
+                      </a:pPr>
+                      <a:r>
+                        <a:t>Primary sources</a:t>
+                      </a:r>
+                    </a:p>
+                  </a:txBody>
+                  <a:tcPr/>
+                </a:tc>
+              </a:tr>
+              <a:tr h="679268">
+                <a:tc>
+                  <a:txBody>
+                    <a:bodyPr/>
+                    <a:lstStyle/>
+                    <a:p>
+                      <a:pPr>
+                        <a:defRPr sz="1200"/>
+                      </a:pPr>
+                      <a:r>
+                        <a:t>OnLot</a:t>
+                      </a:r>
+                    </a:p>
+                  </a:txBody>
+                  <a:tcPr/>
+                </a:tc>
+                <a:tc>
+                  <a:txBody>
+                    <a:bodyPr/>
+                    <a:lstStyle/>
+                    <a:p>
+                      <a:pPr>
+                        <a:defRPr sz="1200"/>
+                      </a:pPr>
+                      <a:r>
+                        <a:t>ON_LOT; ON_PROD</a:t>
+                      </a:r>
+                    </a:p>
+                  </a:txBody>
+                  <a:tcPr/>
+                </a:tc>
+                <a:tc>
+                  <a:txBody>
+                    <a:bodyPr/>
+                    <a:lstStyle/>
+                    <a:p>
+                      <a:pPr>
+                        <a:defRPr sz="1200"/>
+                      </a:pPr>
+                      <a:r>
+                        <a:t>lot, mfgLot, product, fab, sourceLot, lotType, maskSet, process, technology, PTI, family</a:t>
+                      </a:r>
+                    </a:p>
+                  </a:txBody>
+                  <a:tcPr/>
+                </a:tc>
+                <a:tc>
+                  <a:txBody>
+                    <a:bodyPr/>
+                    <a:lstStyle/>
+                    <a:p>
+                      <a:pPr>
+                        <a:defRPr sz="1200"/>
+                      </a:pPr>
+                      <a:r>
+                        <a:t>LotG (native+WS), LTM WS (lotType), Data Warehouse (PLM/MfgArea), MES (Torrent/Genesis)</a:t>
+                      </a:r>
+                    </a:p>
+                  </a:txBody>
+                  <a:tcPr/>
+                </a:tc>
+              </a:tr>
+              <a:tr h="679268">
+                <a:tc>
+                  <a:txBody>
+                    <a:bodyPr/>
+                    <a:lstStyle/>
+                    <a:p>
+                      <a:pPr>
+                        <a:defRPr sz="1200"/>
+                      </a:pPr>
+                      <a:r>
+                        <a:t>OnProd</a:t>
+                      </a:r>
+                    </a:p>
+                  </a:txBody>
+                  <a:tcPr/>
+                </a:tc>
+                <a:tc>
+                  <a:txBody>
+                    <a:bodyPr/>
+                    <a:lstStyle/>
+                    <a:p>
+                      <a:pPr>
+                        <a:defRPr sz="1200"/>
+                      </a:pPr>
+                      <a:r>
+                        <a:t>ON_PROD</a:t>
+                      </a:r>
+                    </a:p>
+                  </a:txBody>
+                  <a:tcPr/>
+                </a:tc>
+                <a:tc>
+                  <a:txBody>
+                    <a:bodyPr/>
+                    <a:lstStyle/>
+                    <a:p>
+                      <a:pPr>
+                        <a:defRPr sz="1200"/>
+                      </a:pPr>
+                      <a:r>
+                        <a:t>product, productVersion, family, process, technology, maskSet, fab</a:t>
+                      </a:r>
+                    </a:p>
+                  </a:txBody>
+                  <a:tcPr/>
+                </a:tc>
+                <a:tc>
+                  <a:txBody>
+                    <a:bodyPr/>
+                    <a:lstStyle/>
+                    <a:p>
+                      <a:pPr>
+                        <a:defRPr sz="1200"/>
+                      </a:pPr>
+                      <a:r>
+                        <a:t>MES (Torrent/Genesis), Data Warehouse PLM/MfgArea, LotG</a:t>
+                      </a:r>
+                    </a:p>
+                  </a:txBody>
+                  <a:tcPr/>
+                </a:tc>
+              </a:tr>
+              <a:tr h="679268">
+                <a:tc>
+                  <a:txBody>
+                    <a:bodyPr/>
+                    <a:lstStyle/>
+                    <a:p>
+                      <a:pPr>
+                        <a:defRPr sz="1200"/>
+                      </a:pPr>
+                      <a:r>
+                        <a:t>OnScribe</a:t>
+                      </a:r>
+                    </a:p>
+                  </a:txBody>
+                  <a:tcPr/>
+                </a:tc>
+                <a:tc>
+                  <a:txBody>
+                    <a:bodyPr/>
+                    <a:lstStyle/>
+                    <a:p>
+                      <a:pPr>
+                        <a:defRPr sz="1200"/>
+                      </a:pPr>
+                      <a:r>
+                        <a:t>ON_SCRIBE</a:t>
+                      </a:r>
+                    </a:p>
+                  </a:txBody>
+                  <a:tcPr/>
+                </a:tc>
+                <a:tc>
+                  <a:txBody>
+                    <a:bodyPr/>
+                    <a:lstStyle/>
+                    <a:p>
+                      <a:pPr>
+                        <a:defRPr sz="1200"/>
+                      </a:pPr>
+                      <a:r>
+                        <a:t>lot, waferNum, waferId, scribeId, insertTime, status</a:t>
+                      </a:r>
+                    </a:p>
+                  </a:txBody>
+                  <a:tcPr/>
+                </a:tc>
+                <a:tc>
+                  <a:txBody>
+                    <a:bodyPr/>
+                    <a:lstStyle/>
+                    <a:p>
+                      <a:pPr>
+                        <a:defRPr sz="1200"/>
+                      </a:pPr>
+                      <a:r>
+                        <a:t>VID↔SCRIBE services (fab-configured); calculated fallback via AttributeUtils; OnLot cache for sourceLot context</a:t>
+                      </a:r>
+                    </a:p>
+                  </a:txBody>
+                  <a:tcPr/>
+                </a:tc>
+              </a:tr>
+              <a:tr h="679268">
+                <a:tc>
+                  <a:txBody>
+                    <a:bodyPr/>
+                    <a:lstStyle/>
+                    <a:p>
+                      <a:pPr>
+                        <a:defRPr sz="1200"/>
+                      </a:pPr>
+                      <a:r>
+                        <a:t>OnSlice</a:t>
+                      </a:r>
+                    </a:p>
+                  </a:txBody>
+                  <a:tcPr/>
+                </a:tc>
+                <a:tc>
+                  <a:txBody>
+                    <a:bodyPr/>
+                    <a:lstStyle/>
+                    <a:p>
+                      <a:pPr>
+                        <a:defRPr sz="1200"/>
+                      </a:pPr>
+                      <a:r>
+                        <a:t>ON_SLICE</a:t>
+                      </a:r>
+                    </a:p>
+                  </a:txBody>
+                  <a:tcPr/>
+                </a:tc>
+                <a:tc>
+                  <a:txBody>
+                    <a:bodyPr/>
+                    <a:lstStyle/>
+                    <a:p>
+                      <a:pPr>
+                        <a:defRPr sz="1200"/>
+                      </a:pPr>
+                      <a:r>
+                        <a:t>slice, globalWaferId, puckId, runId, sliceSourceLot, startLot, fabWaferId, fabSourceLot, slicePartname, sliceLottype, sliceSupplierId, puckHeight, sliceOrder, sliceStartTime</a:t>
+                      </a:r>
+                    </a:p>
+                  </a:txBody>
+                  <a:tcPr/>
+                </a:tc>
+                <a:tc>
+                  <a:txBody>
+                    <a:bodyPr/>
+                    <a:lstStyle/>
+                    <a:p>
+                      <a:pPr>
+                        <a:defRPr sz="1200"/>
+                      </a:pPr>
+                      <a:r>
+                        <a:t>Primary writes via admin DTO/API; upstream ingestion uses BIWMES+eCofA+TORRENT to populate/maintain rows</a:t>
+                      </a:r>
+                    </a:p>
+                  </a:txBody>
+                  <a:tcPr/>
+                </a:tc>
+              </a:tr>
+              <a:tr h="679268">
+                <a:tc>
+                  <a:txBody>
+                    <a:bodyPr/>
+                    <a:lstStyle/>
+                    <a:p>
+                      <a:pPr>
+                        <a:defRPr sz="1200"/>
+                      </a:pPr>
+                      <a:r>
+                        <a:t>OnWmap</a:t>
+                      </a:r>
+                    </a:p>
+                  </a:txBody>
+                  <a:tcPr/>
+                </a:tc>
+                <a:tc>
+                  <a:txBody>
+                    <a:bodyPr/>
+                    <a:lstStyle/>
+                    <a:p>
+                      <a:pPr>
+                        <a:defRPr sz="1200"/>
+                      </a:pPr>
+                      <a:r>
+                        <a:t>ON_WMAP</a:t>
+                      </a:r>
+                    </a:p>
+                  </a:txBody>
+                  <a:tcPr/>
+                </a:tc>
+                <a:tc>
+                  <a:txBody>
+                    <a:bodyPr/>
+                    <a:lstStyle/>
+                    <a:p>
+                      <a:pPr>
+                        <a:defRPr sz="1200"/>
+                      </a:pPr>
+                      <a:r>
+                        <a:t>idWaferMapConfiguration, product/device mapping, metadata per WMC</a:t>
+                      </a:r>
+                    </a:p>
+                  </a:txBody>
+                  <a:tcPr/>
+                </a:tc>
+                <a:tc>
+                  <a:txBody>
+                    <a:bodyPr/>
+                    <a:lstStyle/>
+                    <a:p>
+                      <a:pPr>
+                        <a:defRPr sz="1200"/>
+                      </a:pPr>
+                      <a:r>
+                        <a:t>Matchup service (by lot/scribe) and WMC service (by config/product) via Caller</a:t>
+                      </a:r>
+                    </a:p>
+                  </a:txBody>
+                  <a:tcPr/>
+                </a:tc>
+              </a:tr>
+              <a:tr h="679272">
+                <a:tc>
+                  <a:txBody>
+                    <a:bodyPr/>
+                    <a:lstStyle/>
+                    <a:p>
+                      <a:pPr>
+                        <a:defRPr sz="1200"/>
+                      </a:pPr>
+                      <a:r>
+                        <a:t>PP_LOTPROD (context)</a:t>
+                      </a:r>
+                    </a:p>
+                  </a:txBody>
+                  <a:tcPr/>
+                </a:tc>
+                <a:tc>
+                  <a:txBody>
+                    <a:bodyPr/>
+                    <a:lstStyle/>
+                    <a:p>
+                      <a:pPr>
+                        <a:defRPr sz="1200"/>
+                      </a:pPr>
+                      <a:r>
+                        <a:t>PP_LOTPROD</a:t>
+                      </a:r>
+                    </a:p>
+                  </a:txBody>
+                  <a:tcPr/>
+                </a:tc>
+                <a:tc>
+                  <a:txBody>
+                    <a:bodyPr/>
+                    <a:lstStyle/>
+                    <a:p>
+                      <a:pPr>
+                        <a:defRPr sz="1200"/>
+                      </a:pPr>
+                      <a:r>
+                        <a:t>lot, product, fab (frontend provenance)</a:t>
+                      </a:r>
+                    </a:p>
+                  </a:txBody>
+                  <a:tcPr/>
+                </a:tc>
+                <a:tc>
+                  <a:txBody>
+                    <a:bodyPr/>
+                    <a:lstStyle/>
+                    <a:p>
+                      <a:pPr>
+                        <a:defRPr sz="1200"/>
+                      </a:pPr>
+                      <a:r>
+                        <a:t>Internal PP_LOTPROD DB exposed via /api/pplotprod/bylotid; consumed by ingestion scripts</a:t>
+                      </a:r>
+                    </a:p>
+                  </a:txBody>
+                  <a:tcPr/>
+                </a:tc>
+              </a:tr>
+            </a:tbl>
+          </a:graphicData>
+        </a:graphic>
+      </p:graphicFrame>
+    </p:spTree>
+  </p:cSld>
+  <p:clrMapOvr>
+    <a:masterClrMapping/>
+  </p:clrMapOvr>
+</p:sld>
+</file>
+
 <file path=ppt/slides/slide2.xml><?xml version="1.0" encoding="utf-8"?>
 <p:sld xmlns:a="http://schemas.openxmlformats.org/drawingml/2006/main" xmlns:p="http://schemas.openxmlformats.org/presentationml/2006/main" xmlns:r="http://schemas.openxmlformats.org/officeDocument/2006/relationships">
   <p:cSld>
@@ -3965,7 +5627,7 @@
           <a:lstStyle/>
           <a:p>
             <a:r>
-              <a:t>Endpoint → REFDB tables, columns, and sources</a:t>
+              <a:t>OnLot: per-column source precedence</a:t>
             </a:r>
           </a:p>
         </p:txBody>
@@ -3979,8 +5641,8 @@
           <p:nvPr/>
         </p:nvGraphicFramePr>
         <p:xfrm>
-          <a:off x="274320" y="1188720"/>
-          <a:ext cx="11795760" cy="4754880"/>
+          <a:off x="457200" y="1188720"/>
+          <a:ext cx="11430000" cy="4572000"/>
         </p:xfrm>
         <a:graphic>
           <a:graphicData uri="http://schemas.openxmlformats.org/drawingml/2006/table">
@@ -3989,12 +5651,10 @@
                 <a:tableStyleId>{5C22544A-7EE6-4342-B048-85BDC9FD1C3A}</a:tableStyleId>
               </a:tblPr>
               <a:tblGrid>
-                <a:gridCol w="2948940"/>
-                <a:gridCol w="2948940"/>
-                <a:gridCol w="2948940"/>
-                <a:gridCol w="2948940"/>
+                <a:gridCol w="5715000"/>
+                <a:gridCol w="5715000"/>
               </a:tblGrid>
-              <a:tr h="679268">
+              <a:tr h="415636">
                 <a:tc>
                   <a:txBody>
                     <a:bodyPr/>
@@ -4004,7 +5664,7 @@
                         <a:defRPr b="1" sz="1400"/>
                       </a:pPr>
                       <a:r>
-                        <a:t>Endpoint</a:t>
+                        <a:t>Column</a:t>
                       </a:r>
                     </a:p>
                   </a:txBody>
@@ -4019,409 +5679,327 @@
                         <a:defRPr b="1" sz="1400"/>
                       </a:pPr>
                       <a:r>
-                        <a:t>Final REFDB table(s)</a:t>
-                      </a:r>
-                    </a:p>
-                  </a:txBody>
-                  <a:tcPr/>
-                </a:tc>
-                <a:tc>
-                  <a:txBody>
-                    <a:bodyPr/>
-                    <a:lstStyle/>
-                    <a:p>
-                      <a:pPr>
-                        <a:defRPr b="1" sz="1400"/>
-                      </a:pPr>
-                      <a:r>
-                        <a:t>Key columns populated</a:t>
-                      </a:r>
-                    </a:p>
-                  </a:txBody>
-                  <a:tcPr/>
-                </a:tc>
-                <a:tc>
-                  <a:txBody>
-                    <a:bodyPr/>
-                    <a:lstStyle/>
-                    <a:p>
-                      <a:pPr>
-                        <a:defRPr b="1" sz="1400"/>
-                      </a:pPr>
-                      <a:r>
-                        <a:t>Primary sources</a:t>
+                        <a:t>Source precedence</a:t>
                       </a:r>
                     </a:p>
                   </a:txBody>
                   <a:tcPr/>
                 </a:tc>
               </a:tr>
-              <a:tr h="679268">
-                <a:tc>
-                  <a:txBody>
-                    <a:bodyPr/>
-                    <a:lstStyle/>
-                    <a:p>
-                      <a:pPr>
-                        <a:defRPr sz="1200"/>
-                      </a:pPr>
-                      <a:r>
-                        <a:t>OnLot</a:t>
-                      </a:r>
-                    </a:p>
-                  </a:txBody>
-                  <a:tcPr/>
-                </a:tc>
-                <a:tc>
-                  <a:txBody>
-                    <a:bodyPr/>
-                    <a:lstStyle/>
-                    <a:p>
-                      <a:pPr>
-                        <a:defRPr sz="1200"/>
-                      </a:pPr>
-                      <a:r>
-                        <a:t>ON_LOT; ON_PROD</a:t>
-                      </a:r>
-                    </a:p>
-                  </a:txBody>
-                  <a:tcPr/>
-                </a:tc>
-                <a:tc>
-                  <a:txBody>
-                    <a:bodyPr/>
-                    <a:lstStyle/>
-                    <a:p>
-                      <a:pPr>
-                        <a:defRPr sz="1200"/>
-                      </a:pPr>
-                      <a:r>
-                        <a:t>lot, mfgLot, product, fab, sourceLot, lotType, maskSet, process, technology, PTI, family</a:t>
-                      </a:r>
-                    </a:p>
-                  </a:txBody>
-                  <a:tcPr/>
-                </a:tc>
-                <a:tc>
-                  <a:txBody>
-                    <a:bodyPr/>
-                    <a:lstStyle/>
-                    <a:p>
-                      <a:pPr>
-                        <a:defRPr sz="1200"/>
-                      </a:pPr>
-                      <a:r>
-                        <a:t>LotG (native+WS), LTM WS (lotType), Data Warehouse (PLM/MfgArea), MES (Torrent/Genesis)</a:t>
+              <a:tr h="415636">
+                <a:tc>
+                  <a:txBody>
+                    <a:bodyPr/>
+                    <a:lstStyle/>
+                    <a:p>
+                      <a:pPr>
+                        <a:defRPr sz="1200"/>
+                      </a:pPr>
+                      <a:r>
+                        <a:t>product</a:t>
+                      </a:r>
+                    </a:p>
+                  </a:txBody>
+                  <a:tcPr/>
+                </a:tc>
+                <a:tc>
+                  <a:txBody>
+                    <a:bodyPr/>
+                    <a:lstStyle/>
+                    <a:p>
+                      <a:pPr>
+                        <a:defRPr sz="1200"/>
+                      </a:pPr>
+                      <a:r>
+                        <a:t>MES.product &gt; DW.PLM.partId &gt; LotG.waferPartAlternateProduct &gt; request alternateProduct</a:t>
                       </a:r>
                     </a:p>
                   </a:txBody>
                   <a:tcPr/>
                 </a:tc>
               </a:tr>
-              <a:tr h="679268">
-                <a:tc>
-                  <a:txBody>
-                    <a:bodyPr/>
-                    <a:lstStyle/>
-                    <a:p>
-                      <a:pPr>
-                        <a:defRPr sz="1200"/>
-                      </a:pPr>
-                      <a:r>
-                        <a:t>OnProd</a:t>
-                      </a:r>
-                    </a:p>
-                  </a:txBody>
-                  <a:tcPr/>
-                </a:tc>
-                <a:tc>
-                  <a:txBody>
-                    <a:bodyPr/>
-                    <a:lstStyle/>
-                    <a:p>
-                      <a:pPr>
-                        <a:defRPr sz="1200"/>
-                      </a:pPr>
-                      <a:r>
-                        <a:t>ON_PROD</a:t>
-                      </a:r>
-                    </a:p>
-                  </a:txBody>
-                  <a:tcPr/>
-                </a:tc>
-                <a:tc>
-                  <a:txBody>
-                    <a:bodyPr/>
-                    <a:lstStyle/>
-                    <a:p>
-                      <a:pPr>
-                        <a:defRPr sz="1200"/>
-                      </a:pPr>
-                      <a:r>
-                        <a:t>product, productVersion, family, process, technology, maskSet, fab</a:t>
-                      </a:r>
-                    </a:p>
-                  </a:txBody>
-                  <a:tcPr/>
-                </a:tc>
-                <a:tc>
-                  <a:txBody>
-                    <a:bodyPr/>
-                    <a:lstStyle/>
-                    <a:p>
-                      <a:pPr>
-                        <a:defRPr sz="1200"/>
-                      </a:pPr>
-                      <a:r>
-                        <a:t>MES (Torrent/Genesis), Data Warehouse PLM/MfgArea, LotG</a:t>
+              <a:tr h="415636">
+                <a:tc>
+                  <a:txBody>
+                    <a:bodyPr/>
+                    <a:lstStyle/>
+                    <a:p>
+                      <a:pPr>
+                        <a:defRPr sz="1200"/>
+                      </a:pPr>
+                      <a:r>
+                        <a:t>fab</a:t>
+                      </a:r>
+                    </a:p>
+                  </a:txBody>
+                  <a:tcPr/>
+                </a:tc>
+                <a:tc>
+                  <a:txBody>
+                    <a:bodyPr/>
+                    <a:lstStyle/>
+                    <a:p>
+                      <a:pPr>
+                        <a:defRPr sz="1200"/>
+                      </a:pPr>
+                      <a:r>
+                        <a:t>MES.fab &gt; LotG.fab</a:t>
                       </a:r>
                     </a:p>
                   </a:txBody>
                   <a:tcPr/>
                 </a:tc>
               </a:tr>
-              <a:tr h="679268">
-                <a:tc>
-                  <a:txBody>
-                    <a:bodyPr/>
-                    <a:lstStyle/>
-                    <a:p>
-                      <a:pPr>
-                        <a:defRPr sz="1200"/>
-                      </a:pPr>
-                      <a:r>
-                        <a:t>OnScribe</a:t>
-                      </a:r>
-                    </a:p>
-                  </a:txBody>
-                  <a:tcPr/>
-                </a:tc>
-                <a:tc>
-                  <a:txBody>
-                    <a:bodyPr/>
-                    <a:lstStyle/>
-                    <a:p>
-                      <a:pPr>
-                        <a:defRPr sz="1200"/>
-                      </a:pPr>
-                      <a:r>
-                        <a:t>ON_SCRIBE</a:t>
-                      </a:r>
-                    </a:p>
-                  </a:txBody>
-                  <a:tcPr/>
-                </a:tc>
-                <a:tc>
-                  <a:txBody>
-                    <a:bodyPr/>
-                    <a:lstStyle/>
-                    <a:p>
-                      <a:pPr>
-                        <a:defRPr sz="1200"/>
-                      </a:pPr>
-                      <a:r>
-                        <a:t>lot, waferNum, waferId, scribeId, insertTime, status</a:t>
-                      </a:r>
-                    </a:p>
-                  </a:txBody>
-                  <a:tcPr/>
-                </a:tc>
-                <a:tc>
-                  <a:txBody>
-                    <a:bodyPr/>
-                    <a:lstStyle/>
-                    <a:p>
-                      <a:pPr>
-                        <a:defRPr sz="1200"/>
-                      </a:pPr>
-                      <a:r>
-                        <a:t>VID↔SCRIBE services (fab-configured); calculated fallback via AttributeUtils; OnLot cache for sourceLot context</a:t>
+              <a:tr h="415636">
+                <a:tc>
+                  <a:txBody>
+                    <a:bodyPr/>
+                    <a:lstStyle/>
+                    <a:p>
+                      <a:pPr>
+                        <a:defRPr sz="1200"/>
+                      </a:pPr>
+                      <a:r>
+                        <a:t>sourceLot</a:t>
+                      </a:r>
+                    </a:p>
+                  </a:txBody>
+                  <a:tcPr/>
+                </a:tc>
+                <a:tc>
+                  <a:txBody>
+                    <a:bodyPr/>
+                    <a:lstStyle/>
+                    <a:p>
+                      <a:pPr>
+                        <a:defRPr sz="1200"/>
+                      </a:pPr>
+                      <a:r>
+                        <a:t>LotG native SQL SOURCE_LOT &gt; LotG WS &gt; adjusted by ON_FAB_CONF.sourceLotAdjustmentPattern</a:t>
                       </a:r>
                     </a:p>
                   </a:txBody>
                   <a:tcPr/>
                 </a:tc>
               </a:tr>
-              <a:tr h="679268">
-                <a:tc>
-                  <a:txBody>
-                    <a:bodyPr/>
-                    <a:lstStyle/>
-                    <a:p>
-                      <a:pPr>
-                        <a:defRPr sz="1200"/>
-                      </a:pPr>
-                      <a:r>
-                        <a:t>OnSlice</a:t>
-                      </a:r>
-                    </a:p>
-                  </a:txBody>
-                  <a:tcPr/>
-                </a:tc>
-                <a:tc>
-                  <a:txBody>
-                    <a:bodyPr/>
-                    <a:lstStyle/>
-                    <a:p>
-                      <a:pPr>
-                        <a:defRPr sz="1200"/>
-                      </a:pPr>
-                      <a:r>
-                        <a:t>ON_SLICE</a:t>
-                      </a:r>
-                    </a:p>
-                  </a:txBody>
-                  <a:tcPr/>
-                </a:tc>
-                <a:tc>
-                  <a:txBody>
-                    <a:bodyPr/>
-                    <a:lstStyle/>
-                    <a:p>
-                      <a:pPr>
-                        <a:defRPr sz="1200"/>
-                      </a:pPr>
-                      <a:r>
-                        <a:t>slice, globalWaferId, puckId, runId, sliceSourceLot, startLot, fabWaferId, fabSourceLot, slicePartname, sliceLottype, sliceSupplierId, puckHeight, sliceOrder, sliceStartTime</a:t>
-                      </a:r>
-                    </a:p>
-                  </a:txBody>
-                  <a:tcPr/>
-                </a:tc>
-                <a:tc>
-                  <a:txBody>
-                    <a:bodyPr/>
-                    <a:lstStyle/>
-                    <a:p>
-                      <a:pPr>
-                        <a:defRPr sz="1200"/>
-                      </a:pPr>
-                      <a:r>
-                        <a:t>Primary writes via admin DTO/API; upstream ingestion uses BIWMES+eCofA+TORRENT to populate/maintain rows</a:t>
+              <a:tr h="415636">
+                <a:tc>
+                  <a:txBody>
+                    <a:bodyPr/>
+                    <a:lstStyle/>
+                    <a:p>
+                      <a:pPr>
+                        <a:defRPr sz="1200"/>
+                      </a:pPr>
+                      <a:r>
+                        <a:t>mfgLot</a:t>
+                      </a:r>
+                    </a:p>
+                  </a:txBody>
+                  <a:tcPr/>
+                </a:tc>
+                <a:tc>
+                  <a:txBody>
+                    <a:bodyPr/>
+                    <a:lstStyle/>
+                    <a:p>
+                      <a:pPr>
+                        <a:defRPr sz="1200"/>
+                      </a:pPr>
+                      <a:r>
+                        <a:t>LotG Web Service (foundry/fab lot) &gt; existing (manual preserved)</a:t>
                       </a:r>
                     </a:p>
                   </a:txBody>
                   <a:tcPr/>
                 </a:tc>
               </a:tr>
-              <a:tr h="679268">
-                <a:tc>
-                  <a:txBody>
-                    <a:bodyPr/>
-                    <a:lstStyle/>
-                    <a:p>
-                      <a:pPr>
-                        <a:defRPr sz="1200"/>
-                      </a:pPr>
-                      <a:r>
-                        <a:t>OnWmap</a:t>
-                      </a:r>
-                    </a:p>
-                  </a:txBody>
-                  <a:tcPr/>
-                </a:tc>
-                <a:tc>
-                  <a:txBody>
-                    <a:bodyPr/>
-                    <a:lstStyle/>
-                    <a:p>
-                      <a:pPr>
-                        <a:defRPr sz="1200"/>
-                      </a:pPr>
-                      <a:r>
-                        <a:t>ON_WMAP</a:t>
-                      </a:r>
-                    </a:p>
-                  </a:txBody>
-                  <a:tcPr/>
-                </a:tc>
-                <a:tc>
-                  <a:txBody>
-                    <a:bodyPr/>
-                    <a:lstStyle/>
-                    <a:p>
-                      <a:pPr>
-                        <a:defRPr sz="1200"/>
-                      </a:pPr>
-                      <a:r>
-                        <a:t>idWaferMapConfiguration, product/device mapping, metadata per WMC</a:t>
-                      </a:r>
-                    </a:p>
-                  </a:txBody>
-                  <a:tcPr/>
-                </a:tc>
-                <a:tc>
-                  <a:txBody>
-                    <a:bodyPr/>
-                    <a:lstStyle/>
-                    <a:p>
-                      <a:pPr>
-                        <a:defRPr sz="1200"/>
-                      </a:pPr>
-                      <a:r>
-                        <a:t>Matchup service (by lot/scribe) and WMC service (by config/product) via Caller</a:t>
+              <a:tr h="415636">
+                <a:tc>
+                  <a:txBody>
+                    <a:bodyPr/>
+                    <a:lstStyle/>
+                    <a:p>
+                      <a:pPr>
+                        <a:defRPr sz="1200"/>
+                      </a:pPr>
+                      <a:r>
+                        <a:t>lotType</a:t>
+                      </a:r>
+                    </a:p>
+                  </a:txBody>
+                  <a:tcPr/>
+                </a:tc>
+                <a:tc>
+                  <a:txBody>
+                    <a:bodyPr/>
+                    <a:lstStyle/>
+                    <a:p>
+                      <a:pPr>
+                        <a:defRPr sz="1200"/>
+                      </a:pPr>
+                      <a:r>
+                        <a:t>LTM Web Service &gt; MES &gt; DW &gt; LotG</a:t>
                       </a:r>
                     </a:p>
                   </a:txBody>
                   <a:tcPr/>
                 </a:tc>
               </a:tr>
-              <a:tr h="679272">
-                <a:tc>
-                  <a:txBody>
-                    <a:bodyPr/>
-                    <a:lstStyle/>
-                    <a:p>
-                      <a:pPr>
-                        <a:defRPr sz="1200"/>
-                      </a:pPr>
-                      <a:r>
-                        <a:t>PP_LOTPROD (context)</a:t>
-                      </a:r>
-                    </a:p>
-                  </a:txBody>
-                  <a:tcPr/>
-                </a:tc>
-                <a:tc>
-                  <a:txBody>
-                    <a:bodyPr/>
-                    <a:lstStyle/>
-                    <a:p>
-                      <a:pPr>
-                        <a:defRPr sz="1200"/>
-                      </a:pPr>
-                      <a:r>
-                        <a:t>PP_LOTPROD</a:t>
-                      </a:r>
-                    </a:p>
-                  </a:txBody>
-                  <a:tcPr/>
-                </a:tc>
-                <a:tc>
-                  <a:txBody>
-                    <a:bodyPr/>
-                    <a:lstStyle/>
-                    <a:p>
-                      <a:pPr>
-                        <a:defRPr sz="1200"/>
-                      </a:pPr>
-                      <a:r>
-                        <a:t>lot, product, fab (frontend provenance)</a:t>
-                      </a:r>
-                    </a:p>
-                  </a:txBody>
-                  <a:tcPr/>
-                </a:tc>
-                <a:tc>
-                  <a:txBody>
-                    <a:bodyPr/>
-                    <a:lstStyle/>
-                    <a:p>
-                      <a:pPr>
-                        <a:defRPr sz="1200"/>
-                      </a:pPr>
-                      <a:r>
-                        <a:t>Internal PP_LOTPROD DB exposed via /api/pplotprod/bylotid; consumed by ingestion scripts</a:t>
+              <a:tr h="415636">
+                <a:tc>
+                  <a:txBody>
+                    <a:bodyPr/>
+                    <a:lstStyle/>
+                    <a:p>
+                      <a:pPr>
+                        <a:defRPr sz="1200"/>
+                      </a:pPr>
+                      <a:r>
+                        <a:t>maskSet</a:t>
+                      </a:r>
+                    </a:p>
+                  </a:txBody>
+                  <a:tcPr/>
+                </a:tc>
+                <a:tc>
+                  <a:txBody>
+                    <a:bodyPr/>
+                    <a:lstStyle/>
+                    <a:p>
+                      <a:pPr>
+                        <a:defRPr sz="1200"/>
+                      </a:pPr>
+                      <a:r>
+                        <a:t>MES.maskSet &gt; DW.PLM.MASK_SET</a:t>
+                      </a:r>
+                    </a:p>
+                  </a:txBody>
+                  <a:tcPr/>
+                </a:tc>
+              </a:tr>
+              <a:tr h="415636">
+                <a:tc>
+                  <a:txBody>
+                    <a:bodyPr/>
+                    <a:lstStyle/>
+                    <a:p>
+                      <a:pPr>
+                        <a:defRPr sz="1200"/>
+                      </a:pPr>
+                      <a:r>
+                        <a:t>process</a:t>
+                      </a:r>
+                    </a:p>
+                  </a:txBody>
+                  <a:tcPr/>
+                </a:tc>
+                <a:tc>
+                  <a:txBody>
+                    <a:bodyPr/>
+                    <a:lstStyle/>
+                    <a:p>
+                      <a:pPr>
+                        <a:defRPr sz="1200"/>
+                      </a:pPr>
+                      <a:r>
+                        <a:t>MES.process &gt; DW</a:t>
+                      </a:r>
+                    </a:p>
+                  </a:txBody>
+                  <a:tcPr/>
+                </a:tc>
+              </a:tr>
+              <a:tr h="415636">
+                <a:tc>
+                  <a:txBody>
+                    <a:bodyPr/>
+                    <a:lstStyle/>
+                    <a:p>
+                      <a:pPr>
+                        <a:defRPr sz="1200"/>
+                      </a:pPr>
+                      <a:r>
+                        <a:t>technology</a:t>
+                      </a:r>
+                    </a:p>
+                  </a:txBody>
+                  <a:tcPr/>
+                </a:tc>
+                <a:tc>
+                  <a:txBody>
+                    <a:bodyPr/>
+                    <a:lstStyle/>
+                    <a:p>
+                      <a:pPr>
+                        <a:defRPr sz="1200"/>
+                      </a:pPr>
+                      <a:r>
+                        <a:t>MES.technology &gt; DW</a:t>
+                      </a:r>
+                    </a:p>
+                  </a:txBody>
+                  <a:tcPr/>
+                </a:tc>
+              </a:tr>
+              <a:tr h="415636">
+                <a:tc>
+                  <a:txBody>
+                    <a:bodyPr/>
+                    <a:lstStyle/>
+                    <a:p>
+                      <a:pPr>
+                        <a:defRPr sz="1200"/>
+                      </a:pPr>
+                      <a:r>
+                        <a:t>PTI</a:t>
+                      </a:r>
+                    </a:p>
+                  </a:txBody>
+                  <a:tcPr/>
+                </a:tc>
+                <a:tc>
+                  <a:txBody>
+                    <a:bodyPr/>
+                    <a:lstStyle/>
+                    <a:p>
+                      <a:pPr>
+                        <a:defRPr sz="1200"/>
+                      </a:pPr>
+                      <a:r>
+                        <a:t>MES.PTI_CODE (if configured) &gt; existing</a:t>
+                      </a:r>
+                    </a:p>
+                  </a:txBody>
+                  <a:tcPr/>
+                </a:tc>
+              </a:tr>
+              <a:tr h="415640">
+                <a:tc>
+                  <a:txBody>
+                    <a:bodyPr/>
+                    <a:lstStyle/>
+                    <a:p>
+                      <a:pPr>
+                        <a:defRPr sz="1200"/>
+                      </a:pPr>
+                      <a:r>
+                        <a:t>family</a:t>
+                      </a:r>
+                    </a:p>
+                  </a:txBody>
+                  <a:tcPr/>
+                </a:tc>
+                <a:tc>
+                  <a:txBody>
+                    <a:bodyPr/>
+                    <a:lstStyle/>
+                    <a:p>
+                      <a:pPr>
+                        <a:defRPr sz="1200"/>
+                      </a:pPr>
+                      <a:r>
+                        <a:t>MES.family &gt; DW</a:t>
                       </a:r>
                     </a:p>
                   </a:txBody>

</xml_diff>

<commit_message>
Deck: add legend slide for acronyms and precedence notation
</commit_message>
<xml_diff>
--- a/docs/refb-endpoints-data-sources.pptx
+++ b/docs/refb-endpoints-data-sources.pptx
@@ -19,6 +19,7 @@
     <p:sldId id="267" r:id="rId18"/>
     <p:sldId id="268" r:id="rId19"/>
     <p:sldId id="269" r:id="rId20"/>
+    <p:sldId id="270" r:id="rId21"/>
   </p:sldIdLst>
   <p:sldSz cx="9144000" cy="6858000" type="screen4x3"/>
   <p:notesSz cx="6858000" cy="9144000"/>
@@ -3177,6 +3178,423 @@
           <a:lstStyle/>
           <a:p>
             <a:r>
+              <a:t>OnLot: per-column source precedence</a:t>
+            </a:r>
+          </a:p>
+        </p:txBody>
+      </p:sp>
+      <p:graphicFrame>
+        <p:nvGraphicFramePr>
+          <p:cNvPr id="3" name="Table 2"/>
+          <p:cNvGraphicFramePr>
+            <a:graphicFrameLocks noGrp="1"/>
+          </p:cNvGraphicFramePr>
+          <p:nvPr/>
+        </p:nvGraphicFramePr>
+        <p:xfrm>
+          <a:off x="457200" y="1188720"/>
+          <a:ext cx="11430000" cy="4572000"/>
+        </p:xfrm>
+        <a:graphic>
+          <a:graphicData uri="http://schemas.openxmlformats.org/drawingml/2006/table">
+            <a:tbl>
+              <a:tblPr firstRow="1" bandRow="1">
+                <a:tableStyleId>{5C22544A-7EE6-4342-B048-85BDC9FD1C3A}</a:tableStyleId>
+              </a:tblPr>
+              <a:tblGrid>
+                <a:gridCol w="5715000"/>
+                <a:gridCol w="5715000"/>
+              </a:tblGrid>
+              <a:tr h="415636">
+                <a:tc>
+                  <a:txBody>
+                    <a:bodyPr/>
+                    <a:lstStyle/>
+                    <a:p>
+                      <a:pPr>
+                        <a:defRPr b="1" sz="1400"/>
+                      </a:pPr>
+                      <a:r>
+                        <a:t>Column</a:t>
+                      </a:r>
+                    </a:p>
+                  </a:txBody>
+                  <a:tcPr/>
+                </a:tc>
+                <a:tc>
+                  <a:txBody>
+                    <a:bodyPr/>
+                    <a:lstStyle/>
+                    <a:p>
+                      <a:pPr>
+                        <a:defRPr b="1" sz="1400"/>
+                      </a:pPr>
+                      <a:r>
+                        <a:t>Source precedence</a:t>
+                      </a:r>
+                    </a:p>
+                  </a:txBody>
+                  <a:tcPr/>
+                </a:tc>
+              </a:tr>
+              <a:tr h="415636">
+                <a:tc>
+                  <a:txBody>
+                    <a:bodyPr/>
+                    <a:lstStyle/>
+                    <a:p>
+                      <a:pPr>
+                        <a:defRPr sz="1200"/>
+                      </a:pPr>
+                      <a:r>
+                        <a:t>product</a:t>
+                      </a:r>
+                    </a:p>
+                  </a:txBody>
+                  <a:tcPr/>
+                </a:tc>
+                <a:tc>
+                  <a:txBody>
+                    <a:bodyPr/>
+                    <a:lstStyle/>
+                    <a:p>
+                      <a:pPr>
+                        <a:defRPr sz="1200"/>
+                      </a:pPr>
+                      <a:r>
+                        <a:t>MES.product &gt; DW.PLM.partId &gt; LotG.waferPartAlternateProduct &gt; request alternateProduct</a:t>
+                      </a:r>
+                    </a:p>
+                  </a:txBody>
+                  <a:tcPr/>
+                </a:tc>
+              </a:tr>
+              <a:tr h="415636">
+                <a:tc>
+                  <a:txBody>
+                    <a:bodyPr/>
+                    <a:lstStyle/>
+                    <a:p>
+                      <a:pPr>
+                        <a:defRPr sz="1200"/>
+                      </a:pPr>
+                      <a:r>
+                        <a:t>fab</a:t>
+                      </a:r>
+                    </a:p>
+                  </a:txBody>
+                  <a:tcPr/>
+                </a:tc>
+                <a:tc>
+                  <a:txBody>
+                    <a:bodyPr/>
+                    <a:lstStyle/>
+                    <a:p>
+                      <a:pPr>
+                        <a:defRPr sz="1200"/>
+                      </a:pPr>
+                      <a:r>
+                        <a:t>MES.fab &gt; LotG.fab</a:t>
+                      </a:r>
+                    </a:p>
+                  </a:txBody>
+                  <a:tcPr/>
+                </a:tc>
+              </a:tr>
+              <a:tr h="415636">
+                <a:tc>
+                  <a:txBody>
+                    <a:bodyPr/>
+                    <a:lstStyle/>
+                    <a:p>
+                      <a:pPr>
+                        <a:defRPr sz="1200"/>
+                      </a:pPr>
+                      <a:r>
+                        <a:t>sourceLot</a:t>
+                      </a:r>
+                    </a:p>
+                  </a:txBody>
+                  <a:tcPr/>
+                </a:tc>
+                <a:tc>
+                  <a:txBody>
+                    <a:bodyPr/>
+                    <a:lstStyle/>
+                    <a:p>
+                      <a:pPr>
+                        <a:defRPr sz="1200"/>
+                      </a:pPr>
+                      <a:r>
+                        <a:t>LotG native SQL SOURCE_LOT &gt; LotG WS &gt; adjusted by ON_FAB_CONF.sourceLotAdjustmentPattern</a:t>
+                      </a:r>
+                    </a:p>
+                  </a:txBody>
+                  <a:tcPr/>
+                </a:tc>
+              </a:tr>
+              <a:tr h="415636">
+                <a:tc>
+                  <a:txBody>
+                    <a:bodyPr/>
+                    <a:lstStyle/>
+                    <a:p>
+                      <a:pPr>
+                        <a:defRPr sz="1200"/>
+                      </a:pPr>
+                      <a:r>
+                        <a:t>mfgLot</a:t>
+                      </a:r>
+                    </a:p>
+                  </a:txBody>
+                  <a:tcPr/>
+                </a:tc>
+                <a:tc>
+                  <a:txBody>
+                    <a:bodyPr/>
+                    <a:lstStyle/>
+                    <a:p>
+                      <a:pPr>
+                        <a:defRPr sz="1200"/>
+                      </a:pPr>
+                      <a:r>
+                        <a:t>LotG Web Service (foundry/fab lot) &gt; existing (manual preserved)</a:t>
+                      </a:r>
+                    </a:p>
+                  </a:txBody>
+                  <a:tcPr/>
+                </a:tc>
+              </a:tr>
+              <a:tr h="415636">
+                <a:tc>
+                  <a:txBody>
+                    <a:bodyPr/>
+                    <a:lstStyle/>
+                    <a:p>
+                      <a:pPr>
+                        <a:defRPr sz="1200"/>
+                      </a:pPr>
+                      <a:r>
+                        <a:t>lotType</a:t>
+                      </a:r>
+                    </a:p>
+                  </a:txBody>
+                  <a:tcPr/>
+                </a:tc>
+                <a:tc>
+                  <a:txBody>
+                    <a:bodyPr/>
+                    <a:lstStyle/>
+                    <a:p>
+                      <a:pPr>
+                        <a:defRPr sz="1200"/>
+                      </a:pPr>
+                      <a:r>
+                        <a:t>LTM Web Service &gt; MES &gt; DW &gt; LotG</a:t>
+                      </a:r>
+                    </a:p>
+                  </a:txBody>
+                  <a:tcPr/>
+                </a:tc>
+              </a:tr>
+              <a:tr h="415636">
+                <a:tc>
+                  <a:txBody>
+                    <a:bodyPr/>
+                    <a:lstStyle/>
+                    <a:p>
+                      <a:pPr>
+                        <a:defRPr sz="1200"/>
+                      </a:pPr>
+                      <a:r>
+                        <a:t>maskSet</a:t>
+                      </a:r>
+                    </a:p>
+                  </a:txBody>
+                  <a:tcPr/>
+                </a:tc>
+                <a:tc>
+                  <a:txBody>
+                    <a:bodyPr/>
+                    <a:lstStyle/>
+                    <a:p>
+                      <a:pPr>
+                        <a:defRPr sz="1200"/>
+                      </a:pPr>
+                      <a:r>
+                        <a:t>MES.maskSet &gt; DW.PLM.MASK_SET</a:t>
+                      </a:r>
+                    </a:p>
+                  </a:txBody>
+                  <a:tcPr/>
+                </a:tc>
+              </a:tr>
+              <a:tr h="415636">
+                <a:tc>
+                  <a:txBody>
+                    <a:bodyPr/>
+                    <a:lstStyle/>
+                    <a:p>
+                      <a:pPr>
+                        <a:defRPr sz="1200"/>
+                      </a:pPr>
+                      <a:r>
+                        <a:t>process</a:t>
+                      </a:r>
+                    </a:p>
+                  </a:txBody>
+                  <a:tcPr/>
+                </a:tc>
+                <a:tc>
+                  <a:txBody>
+                    <a:bodyPr/>
+                    <a:lstStyle/>
+                    <a:p>
+                      <a:pPr>
+                        <a:defRPr sz="1200"/>
+                      </a:pPr>
+                      <a:r>
+                        <a:t>MES.process &gt; DW</a:t>
+                      </a:r>
+                    </a:p>
+                  </a:txBody>
+                  <a:tcPr/>
+                </a:tc>
+              </a:tr>
+              <a:tr h="415636">
+                <a:tc>
+                  <a:txBody>
+                    <a:bodyPr/>
+                    <a:lstStyle/>
+                    <a:p>
+                      <a:pPr>
+                        <a:defRPr sz="1200"/>
+                      </a:pPr>
+                      <a:r>
+                        <a:t>technology</a:t>
+                      </a:r>
+                    </a:p>
+                  </a:txBody>
+                  <a:tcPr/>
+                </a:tc>
+                <a:tc>
+                  <a:txBody>
+                    <a:bodyPr/>
+                    <a:lstStyle/>
+                    <a:p>
+                      <a:pPr>
+                        <a:defRPr sz="1200"/>
+                      </a:pPr>
+                      <a:r>
+                        <a:t>MES.technology &gt; DW</a:t>
+                      </a:r>
+                    </a:p>
+                  </a:txBody>
+                  <a:tcPr/>
+                </a:tc>
+              </a:tr>
+              <a:tr h="415636">
+                <a:tc>
+                  <a:txBody>
+                    <a:bodyPr/>
+                    <a:lstStyle/>
+                    <a:p>
+                      <a:pPr>
+                        <a:defRPr sz="1200"/>
+                      </a:pPr>
+                      <a:r>
+                        <a:t>PTI</a:t>
+                      </a:r>
+                    </a:p>
+                  </a:txBody>
+                  <a:tcPr/>
+                </a:tc>
+                <a:tc>
+                  <a:txBody>
+                    <a:bodyPr/>
+                    <a:lstStyle/>
+                    <a:p>
+                      <a:pPr>
+                        <a:defRPr sz="1200"/>
+                      </a:pPr>
+                      <a:r>
+                        <a:t>MES.PTI_CODE (if configured) &gt; existing</a:t>
+                      </a:r>
+                    </a:p>
+                  </a:txBody>
+                  <a:tcPr/>
+                </a:tc>
+              </a:tr>
+              <a:tr h="415640">
+                <a:tc>
+                  <a:txBody>
+                    <a:bodyPr/>
+                    <a:lstStyle/>
+                    <a:p>
+                      <a:pPr>
+                        <a:defRPr sz="1200"/>
+                      </a:pPr>
+                      <a:r>
+                        <a:t>family</a:t>
+                      </a:r>
+                    </a:p>
+                  </a:txBody>
+                  <a:tcPr/>
+                </a:tc>
+                <a:tc>
+                  <a:txBody>
+                    <a:bodyPr/>
+                    <a:lstStyle/>
+                    <a:p>
+                      <a:pPr>
+                        <a:defRPr sz="1200"/>
+                      </a:pPr>
+                      <a:r>
+                        <a:t>MES.family &gt; DW</a:t>
+                      </a:r>
+                    </a:p>
+                  </a:txBody>
+                  <a:tcPr/>
+                </a:tc>
+              </a:tr>
+            </a:tbl>
+          </a:graphicData>
+        </a:graphic>
+      </p:graphicFrame>
+    </p:spTree>
+  </p:cSld>
+  <p:clrMapOvr>
+    <a:masterClrMapping/>
+  </p:clrMapOvr>
+</p:sld>
+</file>
+
+<file path=ppt/slides/slide11.xml><?xml version="1.0" encoding="utf-8"?>
+<p:sld xmlns:a="http://schemas.openxmlformats.org/drawingml/2006/main" xmlns:p="http://schemas.openxmlformats.org/presentationml/2006/main" xmlns:r="http://schemas.openxmlformats.org/officeDocument/2006/relationships">
+  <p:cSld>
+    <p:spTree>
+      <p:nvGrpSpPr>
+        <p:cNvPr id="1" name=""/>
+        <p:cNvGrpSpPr/>
+        <p:nvPr/>
+      </p:nvGrpSpPr>
+      <p:grpSpPr/>
+      <p:sp>
+        <p:nvSpPr>
+          <p:cNvPr id="2" name="Title 1"/>
+          <p:cNvSpPr>
+            <a:spLocks noGrp="1"/>
+          </p:cNvSpPr>
+          <p:nvPr>
+            <p:ph type="title"/>
+          </p:nvPr>
+        </p:nvSpPr>
+        <p:spPr/>
+        <p:txBody>
+          <a:bodyPr/>
+          <a:lstStyle/>
+          <a:p>
+            <a:r>
               <a:t>OnProd: per-column source precedence</a:t>
             </a:r>
           </a:p>
@@ -3472,7 +3890,7 @@
 </p:sld>
 </file>
 
-<file path=ppt/slides/slide11.xml><?xml version="1.0" encoding="utf-8"?>
+<file path=ppt/slides/slide12.xml><?xml version="1.0" encoding="utf-8"?>
 <p:sld xmlns:a="http://schemas.openxmlformats.org/drawingml/2006/main" xmlns:p="http://schemas.openxmlformats.org/presentationml/2006/main" xmlns:r="http://schemas.openxmlformats.org/officeDocument/2006/relationships">
   <p:cSld>
     <p:spTree>
@@ -3761,7 +4179,7 @@
 </p:sld>
 </file>
 
-<file path=ppt/slides/slide12.xml><?xml version="1.0" encoding="utf-8"?>
+<file path=ppt/slides/slide13.xml><?xml version="1.0" encoding="utf-8"?>
 <p:sld xmlns:a="http://schemas.openxmlformats.org/drawingml/2006/main" xmlns:p="http://schemas.openxmlformats.org/presentationml/2006/main" xmlns:r="http://schemas.openxmlformats.org/officeDocument/2006/relationships">
   <p:cSld>
     <p:spTree>
@@ -4114,7 +4532,7 @@
 </p:sld>
 </file>
 
-<file path=ppt/slides/slide13.xml><?xml version="1.0" encoding="utf-8"?>
+<file path=ppt/slides/slide14.xml><?xml version="1.0" encoding="utf-8"?>
 <p:sld xmlns:a="http://schemas.openxmlformats.org/drawingml/2006/main" xmlns:p="http://schemas.openxmlformats.org/presentationml/2006/main" xmlns:r="http://schemas.openxmlformats.org/officeDocument/2006/relationships">
   <p:cSld>
     <p:spTree>
@@ -4307,7 +4725,7 @@
 </p:sld>
 </file>
 
-<file path=ppt/slides/slide14.xml><?xml version="1.0" encoding="utf-8"?>
+<file path=ppt/slides/slide15.xml><?xml version="1.0" encoding="utf-8"?>
 <p:sld xmlns:a="http://schemas.openxmlformats.org/drawingml/2006/main" xmlns:p="http://schemas.openxmlformats.org/presentationml/2006/main" xmlns:r="http://schemas.openxmlformats.org/officeDocument/2006/relationships">
   <p:cSld>
     <p:spTree>
@@ -4809,6 +5227,136 @@
 </file>
 
 <file path=ppt/slides/slide2.xml><?xml version="1.0" encoding="utf-8"?>
+<p:sld xmlns:a="http://schemas.openxmlformats.org/drawingml/2006/main" xmlns:p="http://schemas.openxmlformats.org/presentationml/2006/main" xmlns:r="http://schemas.openxmlformats.org/officeDocument/2006/relationships">
+  <p:cSld>
+    <p:spTree>
+      <p:nvGrpSpPr>
+        <p:cNvPr id="1" name=""/>
+        <p:cNvGrpSpPr/>
+        <p:nvPr/>
+      </p:nvGrpSpPr>
+      <p:grpSpPr/>
+      <p:sp>
+        <p:nvSpPr>
+          <p:cNvPr id="2" name="Title 1"/>
+          <p:cNvSpPr>
+            <a:spLocks noGrp="1"/>
+          </p:cNvSpPr>
+          <p:nvPr>
+            <p:ph type="title"/>
+          </p:nvPr>
+        </p:nvSpPr>
+        <p:spPr/>
+        <p:txBody>
+          <a:bodyPr/>
+          <a:lstStyle/>
+          <a:p>
+            <a:r>
+              <a:t>Legend: acronyms and precedence</a:t>
+            </a:r>
+          </a:p>
+        </p:txBody>
+      </p:sp>
+      <p:sp>
+        <p:nvSpPr>
+          <p:cNvPr id="3" name="TextBox 2"/>
+          <p:cNvSpPr txBox="1"/>
+          <p:nvPr/>
+        </p:nvSpPr>
+        <p:spPr>
+          <a:xfrm>
+            <a:off x="548640" y="1371600"/>
+            <a:ext cx="10515600" cy="4572000"/>
+          </a:xfrm>
+          <a:prstGeom prst="rect">
+            <a:avLst/>
+          </a:prstGeom>
+          <a:noFill/>
+        </p:spPr>
+        <p:txBody>
+          <a:bodyPr wrap="square">
+            <a:spAutoFit/>
+          </a:bodyPr>
+          <a:lstStyle/>
+          <a:p>
+            <a:r>
+              <a:t>Acronyms:</a:t>
+            </a:r>
+          </a:p>
+          <a:p>
+            <a:pPr lvl="1"/>
+            <a:r>
+              <a:t>LotG = Legacy genealogy DB (native SQL) and LotG Web Service</a:t>
+            </a:r>
+          </a:p>
+          <a:p>
+            <a:pPr lvl="1"/>
+            <a:r>
+              <a:t>LTM = Lot Type Management Web Service</a:t>
+            </a:r>
+          </a:p>
+          <a:p>
+            <a:pPr lvl="1"/>
+            <a:r>
+              <a:t>DW = Data Warehouse (PLM/MfgArea lookups)</a:t>
+            </a:r>
+          </a:p>
+          <a:p>
+            <a:pPr lvl="1"/>
+            <a:r>
+              <a:t>MES = Manufacturing Execution System (Torrent/Genesis)</a:t>
+            </a:r>
+          </a:p>
+          <a:p>
+            <a:pPr lvl="1"/>
+            <a:r>
+              <a:t>WMC = Wafer Map Configuration service; Matchup = lot/scribe→config</a:t>
+            </a:r>
+          </a:p>
+          <a:p>
+            <a:pPr lvl="1"/>
+            <a:r>
+              <a:t>VID/SCRIBE = Wafer ID ↔ Laser Scribe web services</a:t>
+            </a:r>
+          </a:p>
+          <a:p>
+            <a:pPr lvl="1"/>
+            <a:r>
+              <a:t>eCofA = Epi/raw silicon data provider used in slice genealogy</a:t>
+            </a:r>
+          </a:p>
+          <a:p>
+            <a:pPr lvl="1"/>
+            <a:r>
+              <a:t>REFDB = Local Exensio reference tables (ON_LOT, ON_PROD, ON_SCRIBE, ON_SLICE, ON_WMAP)</a:t>
+            </a:r>
+          </a:p>
+          <a:p>
+            <a:pPr lvl="1"/>
+            <a:r>
+              <a:t>PP_LOTPROD = Internal table/endpoint for lot→product/fab</a:t>
+            </a:r>
+          </a:p>
+          <a:p>
+            <a:pPr lvl="1"/>
+          </a:p>
+          <a:p>
+            <a:pPr/>
+            <a:r>
+              <a:t>Precedence notation: A &gt; B &gt; C means A overwrites B overwrites C when present</a:t>
+            </a:r>
+          </a:p>
+        </p:txBody>
+      </p:sp>
+    </p:spTree>
+  </p:cSld>
+  <p:clrMapOvr>
+    <a:masterClrMapping/>
+  </p:clrMapOvr>
+</p:sld>
+</file>
+
+<file path=ppt/slides/slide3.xml><?xml version="1.0" encoding="utf-8"?>
 <p:sld xmlns:a="http://schemas.openxmlformats.org/drawingml/2006/main" xmlns:p="http://schemas.openxmlformats.org/presentationml/2006/main" xmlns:r="http://schemas.openxmlformats.org/officeDocument/2006/relationships">
   <p:cSld>
     <p:spTree>
@@ -4926,7 +5474,7 @@
 </p:sld>
 </file>
 
-<file path=ppt/slides/slide3.xml><?xml version="1.0" encoding="utf-8"?>
+<file path=ppt/slides/slide4.xml><?xml version="1.0" encoding="utf-8"?>
 <p:sld xmlns:a="http://schemas.openxmlformats.org/drawingml/2006/main" xmlns:p="http://schemas.openxmlformats.org/presentationml/2006/main" xmlns:r="http://schemas.openxmlformats.org/officeDocument/2006/relationships">
   <p:cSld>
     <p:spTree>
@@ -5044,7 +5592,7 @@
 </p:sld>
 </file>
 
-<file path=ppt/slides/slide4.xml><?xml version="1.0" encoding="utf-8"?>
+<file path=ppt/slides/slide5.xml><?xml version="1.0" encoding="utf-8"?>
 <p:sld xmlns:a="http://schemas.openxmlformats.org/drawingml/2006/main" xmlns:p="http://schemas.openxmlformats.org/presentationml/2006/main" xmlns:r="http://schemas.openxmlformats.org/officeDocument/2006/relationships">
   <p:cSld>
     <p:spTree>
@@ -5162,7 +5710,7 @@
 </p:sld>
 </file>
 
-<file path=ppt/slides/slide5.xml><?xml version="1.0" encoding="utf-8"?>
+<file path=ppt/slides/slide6.xml><?xml version="1.0" encoding="utf-8"?>
 <p:sld xmlns:a="http://schemas.openxmlformats.org/drawingml/2006/main" xmlns:p="http://schemas.openxmlformats.org/presentationml/2006/main" xmlns:r="http://schemas.openxmlformats.org/officeDocument/2006/relationships">
   <p:cSld>
     <p:spTree>
@@ -5280,7 +5828,7 @@
 </p:sld>
 </file>
 
-<file path=ppt/slides/slide6.xml><?xml version="1.0" encoding="utf-8"?>
+<file path=ppt/slides/slide7.xml><?xml version="1.0" encoding="utf-8"?>
 <p:sld xmlns:a="http://schemas.openxmlformats.org/drawingml/2006/main" xmlns:p="http://schemas.openxmlformats.org/presentationml/2006/main" xmlns:r="http://schemas.openxmlformats.org/officeDocument/2006/relationships">
   <p:cSld>
     <p:spTree>
@@ -5398,7 +5946,7 @@
 </p:sld>
 </file>
 
-<file path=ppt/slides/slide7.xml><?xml version="1.0" encoding="utf-8"?>
+<file path=ppt/slides/slide8.xml><?xml version="1.0" encoding="utf-8"?>
 <p:sld xmlns:a="http://schemas.openxmlformats.org/drawingml/2006/main" xmlns:p="http://schemas.openxmlformats.org/presentationml/2006/main" xmlns:r="http://schemas.openxmlformats.org/officeDocument/2006/relationships">
   <p:cSld>
     <p:spTree>
@@ -5516,7 +6064,7 @@
 </p:sld>
 </file>
 
-<file path=ppt/slides/slide8.xml><?xml version="1.0" encoding="utf-8"?>
+<file path=ppt/slides/slide9.xml><?xml version="1.0" encoding="utf-8"?>
 <p:sld xmlns:a="http://schemas.openxmlformats.org/drawingml/2006/main" xmlns:p="http://schemas.openxmlformats.org/presentationml/2006/main" xmlns:r="http://schemas.openxmlformats.org/officeDocument/2006/relationships">
   <p:cSld>
     <p:spTree>
@@ -5593,423 +6141,6 @@
           </a:p>
         </p:txBody>
       </p:sp>
-    </p:spTree>
-  </p:cSld>
-  <p:clrMapOvr>
-    <a:masterClrMapping/>
-  </p:clrMapOvr>
-</p:sld>
-</file>
-
-<file path=ppt/slides/slide9.xml><?xml version="1.0" encoding="utf-8"?>
-<p:sld xmlns:a="http://schemas.openxmlformats.org/drawingml/2006/main" xmlns:p="http://schemas.openxmlformats.org/presentationml/2006/main" xmlns:r="http://schemas.openxmlformats.org/officeDocument/2006/relationships">
-  <p:cSld>
-    <p:spTree>
-      <p:nvGrpSpPr>
-        <p:cNvPr id="1" name=""/>
-        <p:cNvGrpSpPr/>
-        <p:nvPr/>
-      </p:nvGrpSpPr>
-      <p:grpSpPr/>
-      <p:sp>
-        <p:nvSpPr>
-          <p:cNvPr id="2" name="Title 1"/>
-          <p:cNvSpPr>
-            <a:spLocks noGrp="1"/>
-          </p:cNvSpPr>
-          <p:nvPr>
-            <p:ph type="title"/>
-          </p:nvPr>
-        </p:nvSpPr>
-        <p:spPr/>
-        <p:txBody>
-          <a:bodyPr/>
-          <a:lstStyle/>
-          <a:p>
-            <a:r>
-              <a:t>OnLot: per-column source precedence</a:t>
-            </a:r>
-          </a:p>
-        </p:txBody>
-      </p:sp>
-      <p:graphicFrame>
-        <p:nvGraphicFramePr>
-          <p:cNvPr id="3" name="Table 2"/>
-          <p:cNvGraphicFramePr>
-            <a:graphicFrameLocks noGrp="1"/>
-          </p:cNvGraphicFramePr>
-          <p:nvPr/>
-        </p:nvGraphicFramePr>
-        <p:xfrm>
-          <a:off x="457200" y="1188720"/>
-          <a:ext cx="11430000" cy="4572000"/>
-        </p:xfrm>
-        <a:graphic>
-          <a:graphicData uri="http://schemas.openxmlformats.org/drawingml/2006/table">
-            <a:tbl>
-              <a:tblPr firstRow="1" bandRow="1">
-                <a:tableStyleId>{5C22544A-7EE6-4342-B048-85BDC9FD1C3A}</a:tableStyleId>
-              </a:tblPr>
-              <a:tblGrid>
-                <a:gridCol w="5715000"/>
-                <a:gridCol w="5715000"/>
-              </a:tblGrid>
-              <a:tr h="415636">
-                <a:tc>
-                  <a:txBody>
-                    <a:bodyPr/>
-                    <a:lstStyle/>
-                    <a:p>
-                      <a:pPr>
-                        <a:defRPr b="1" sz="1400"/>
-                      </a:pPr>
-                      <a:r>
-                        <a:t>Column</a:t>
-                      </a:r>
-                    </a:p>
-                  </a:txBody>
-                  <a:tcPr/>
-                </a:tc>
-                <a:tc>
-                  <a:txBody>
-                    <a:bodyPr/>
-                    <a:lstStyle/>
-                    <a:p>
-                      <a:pPr>
-                        <a:defRPr b="1" sz="1400"/>
-                      </a:pPr>
-                      <a:r>
-                        <a:t>Source precedence</a:t>
-                      </a:r>
-                    </a:p>
-                  </a:txBody>
-                  <a:tcPr/>
-                </a:tc>
-              </a:tr>
-              <a:tr h="415636">
-                <a:tc>
-                  <a:txBody>
-                    <a:bodyPr/>
-                    <a:lstStyle/>
-                    <a:p>
-                      <a:pPr>
-                        <a:defRPr sz="1200"/>
-                      </a:pPr>
-                      <a:r>
-                        <a:t>product</a:t>
-                      </a:r>
-                    </a:p>
-                  </a:txBody>
-                  <a:tcPr/>
-                </a:tc>
-                <a:tc>
-                  <a:txBody>
-                    <a:bodyPr/>
-                    <a:lstStyle/>
-                    <a:p>
-                      <a:pPr>
-                        <a:defRPr sz="1200"/>
-                      </a:pPr>
-                      <a:r>
-                        <a:t>MES.product &gt; DW.PLM.partId &gt; LotG.waferPartAlternateProduct &gt; request alternateProduct</a:t>
-                      </a:r>
-                    </a:p>
-                  </a:txBody>
-                  <a:tcPr/>
-                </a:tc>
-              </a:tr>
-              <a:tr h="415636">
-                <a:tc>
-                  <a:txBody>
-                    <a:bodyPr/>
-                    <a:lstStyle/>
-                    <a:p>
-                      <a:pPr>
-                        <a:defRPr sz="1200"/>
-                      </a:pPr>
-                      <a:r>
-                        <a:t>fab</a:t>
-                      </a:r>
-                    </a:p>
-                  </a:txBody>
-                  <a:tcPr/>
-                </a:tc>
-                <a:tc>
-                  <a:txBody>
-                    <a:bodyPr/>
-                    <a:lstStyle/>
-                    <a:p>
-                      <a:pPr>
-                        <a:defRPr sz="1200"/>
-                      </a:pPr>
-                      <a:r>
-                        <a:t>MES.fab &gt; LotG.fab</a:t>
-                      </a:r>
-                    </a:p>
-                  </a:txBody>
-                  <a:tcPr/>
-                </a:tc>
-              </a:tr>
-              <a:tr h="415636">
-                <a:tc>
-                  <a:txBody>
-                    <a:bodyPr/>
-                    <a:lstStyle/>
-                    <a:p>
-                      <a:pPr>
-                        <a:defRPr sz="1200"/>
-                      </a:pPr>
-                      <a:r>
-                        <a:t>sourceLot</a:t>
-                      </a:r>
-                    </a:p>
-                  </a:txBody>
-                  <a:tcPr/>
-                </a:tc>
-                <a:tc>
-                  <a:txBody>
-                    <a:bodyPr/>
-                    <a:lstStyle/>
-                    <a:p>
-                      <a:pPr>
-                        <a:defRPr sz="1200"/>
-                      </a:pPr>
-                      <a:r>
-                        <a:t>LotG native SQL SOURCE_LOT &gt; LotG WS &gt; adjusted by ON_FAB_CONF.sourceLotAdjustmentPattern</a:t>
-                      </a:r>
-                    </a:p>
-                  </a:txBody>
-                  <a:tcPr/>
-                </a:tc>
-              </a:tr>
-              <a:tr h="415636">
-                <a:tc>
-                  <a:txBody>
-                    <a:bodyPr/>
-                    <a:lstStyle/>
-                    <a:p>
-                      <a:pPr>
-                        <a:defRPr sz="1200"/>
-                      </a:pPr>
-                      <a:r>
-                        <a:t>mfgLot</a:t>
-                      </a:r>
-                    </a:p>
-                  </a:txBody>
-                  <a:tcPr/>
-                </a:tc>
-                <a:tc>
-                  <a:txBody>
-                    <a:bodyPr/>
-                    <a:lstStyle/>
-                    <a:p>
-                      <a:pPr>
-                        <a:defRPr sz="1200"/>
-                      </a:pPr>
-                      <a:r>
-                        <a:t>LotG Web Service (foundry/fab lot) &gt; existing (manual preserved)</a:t>
-                      </a:r>
-                    </a:p>
-                  </a:txBody>
-                  <a:tcPr/>
-                </a:tc>
-              </a:tr>
-              <a:tr h="415636">
-                <a:tc>
-                  <a:txBody>
-                    <a:bodyPr/>
-                    <a:lstStyle/>
-                    <a:p>
-                      <a:pPr>
-                        <a:defRPr sz="1200"/>
-                      </a:pPr>
-                      <a:r>
-                        <a:t>lotType</a:t>
-                      </a:r>
-                    </a:p>
-                  </a:txBody>
-                  <a:tcPr/>
-                </a:tc>
-                <a:tc>
-                  <a:txBody>
-                    <a:bodyPr/>
-                    <a:lstStyle/>
-                    <a:p>
-                      <a:pPr>
-                        <a:defRPr sz="1200"/>
-                      </a:pPr>
-                      <a:r>
-                        <a:t>LTM Web Service &gt; MES &gt; DW &gt; LotG</a:t>
-                      </a:r>
-                    </a:p>
-                  </a:txBody>
-                  <a:tcPr/>
-                </a:tc>
-              </a:tr>
-              <a:tr h="415636">
-                <a:tc>
-                  <a:txBody>
-                    <a:bodyPr/>
-                    <a:lstStyle/>
-                    <a:p>
-                      <a:pPr>
-                        <a:defRPr sz="1200"/>
-                      </a:pPr>
-                      <a:r>
-                        <a:t>maskSet</a:t>
-                      </a:r>
-                    </a:p>
-                  </a:txBody>
-                  <a:tcPr/>
-                </a:tc>
-                <a:tc>
-                  <a:txBody>
-                    <a:bodyPr/>
-                    <a:lstStyle/>
-                    <a:p>
-                      <a:pPr>
-                        <a:defRPr sz="1200"/>
-                      </a:pPr>
-                      <a:r>
-                        <a:t>MES.maskSet &gt; DW.PLM.MASK_SET</a:t>
-                      </a:r>
-                    </a:p>
-                  </a:txBody>
-                  <a:tcPr/>
-                </a:tc>
-              </a:tr>
-              <a:tr h="415636">
-                <a:tc>
-                  <a:txBody>
-                    <a:bodyPr/>
-                    <a:lstStyle/>
-                    <a:p>
-                      <a:pPr>
-                        <a:defRPr sz="1200"/>
-                      </a:pPr>
-                      <a:r>
-                        <a:t>process</a:t>
-                      </a:r>
-                    </a:p>
-                  </a:txBody>
-                  <a:tcPr/>
-                </a:tc>
-                <a:tc>
-                  <a:txBody>
-                    <a:bodyPr/>
-                    <a:lstStyle/>
-                    <a:p>
-                      <a:pPr>
-                        <a:defRPr sz="1200"/>
-                      </a:pPr>
-                      <a:r>
-                        <a:t>MES.process &gt; DW</a:t>
-                      </a:r>
-                    </a:p>
-                  </a:txBody>
-                  <a:tcPr/>
-                </a:tc>
-              </a:tr>
-              <a:tr h="415636">
-                <a:tc>
-                  <a:txBody>
-                    <a:bodyPr/>
-                    <a:lstStyle/>
-                    <a:p>
-                      <a:pPr>
-                        <a:defRPr sz="1200"/>
-                      </a:pPr>
-                      <a:r>
-                        <a:t>technology</a:t>
-                      </a:r>
-                    </a:p>
-                  </a:txBody>
-                  <a:tcPr/>
-                </a:tc>
-                <a:tc>
-                  <a:txBody>
-                    <a:bodyPr/>
-                    <a:lstStyle/>
-                    <a:p>
-                      <a:pPr>
-                        <a:defRPr sz="1200"/>
-                      </a:pPr>
-                      <a:r>
-                        <a:t>MES.technology &gt; DW</a:t>
-                      </a:r>
-                    </a:p>
-                  </a:txBody>
-                  <a:tcPr/>
-                </a:tc>
-              </a:tr>
-              <a:tr h="415636">
-                <a:tc>
-                  <a:txBody>
-                    <a:bodyPr/>
-                    <a:lstStyle/>
-                    <a:p>
-                      <a:pPr>
-                        <a:defRPr sz="1200"/>
-                      </a:pPr>
-                      <a:r>
-                        <a:t>PTI</a:t>
-                      </a:r>
-                    </a:p>
-                  </a:txBody>
-                  <a:tcPr/>
-                </a:tc>
-                <a:tc>
-                  <a:txBody>
-                    <a:bodyPr/>
-                    <a:lstStyle/>
-                    <a:p>
-                      <a:pPr>
-                        <a:defRPr sz="1200"/>
-                      </a:pPr>
-                      <a:r>
-                        <a:t>MES.PTI_CODE (if configured) &gt; existing</a:t>
-                      </a:r>
-                    </a:p>
-                  </a:txBody>
-                  <a:tcPr/>
-                </a:tc>
-              </a:tr>
-              <a:tr h="415640">
-                <a:tc>
-                  <a:txBody>
-                    <a:bodyPr/>
-                    <a:lstStyle/>
-                    <a:p>
-                      <a:pPr>
-                        <a:defRPr sz="1200"/>
-                      </a:pPr>
-                      <a:r>
-                        <a:t>family</a:t>
-                      </a:r>
-                    </a:p>
-                  </a:txBody>
-                  <a:tcPr/>
-                </a:tc>
-                <a:tc>
-                  <a:txBody>
-                    <a:bodyPr/>
-                    <a:lstStyle/>
-                    <a:p>
-                      <a:pPr>
-                        <a:defRPr sz="1200"/>
-                      </a:pPr>
-                      <a:r>
-                        <a:t>MES.family &gt; DW</a:t>
-                      </a:r>
-                    </a:p>
-                  </a:txBody>
-                  <a:tcPr/>
-                </a:tc>
-              </a:tr>
-            </a:tbl>
-          </a:graphicData>
-        </a:graphic>
-      </p:graphicFrame>
     </p:spTree>
   </p:cSld>
   <p:clrMapOvr>

</xml_diff>